<commit_message>
Erste Version des Punktes Kommunikation der PowerPoint
</commit_message>
<xml_diff>
--- a/Chess Server.pptx
+++ b/Chess Server.pptx
@@ -5,7 +5,7 @@
     <p:sldMasterId id="2147483780" r:id="rId1"/>
   </p:sldMasterIdLst>
   <p:notesMasterIdLst>
-    <p:notesMasterId r:id="rId10"/>
+    <p:notesMasterId r:id="rId16"/>
   </p:notesMasterIdLst>
   <p:sldIdLst>
     <p:sldId id="256" r:id="rId2"/>
@@ -16,6 +16,12 @@
     <p:sldId id="260" r:id="rId7"/>
     <p:sldId id="261" r:id="rId8"/>
     <p:sldId id="264" r:id="rId9"/>
+    <p:sldId id="265" r:id="rId10"/>
+    <p:sldId id="270" r:id="rId11"/>
+    <p:sldId id="266" r:id="rId12"/>
+    <p:sldId id="272" r:id="rId13"/>
+    <p:sldId id="268" r:id="rId14"/>
+    <p:sldId id="269" r:id="rId15"/>
   </p:sldIdLst>
   <p:sldSz cx="9144000" cy="6858000" type="screen4x3"/>
   <p:notesSz cx="6858000" cy="9144000"/>
@@ -215,7 +221,7 @@
           <a:p>
             <a:fld id="{ACAF67F9-9C4E-4362-9F06-EEA5D71DE91B}" type="datetimeFigureOut">
               <a:rPr lang="de-DE" smtClean="0"/>
-              <a:t>20.12.2022</a:t>
+              <a:t>08.01.2023</a:t>
             </a:fld>
             <a:endParaRPr lang="de-DE"/>
           </a:p>
@@ -580,6 +586,90 @@
 </p:notes>
 </file>
 
+<file path=ppt/notesSlides/notesSlide2.xml><?xml version="1.0" encoding="utf-8"?>
+<p:notes xmlns:a="http://schemas.openxmlformats.org/drawingml/2006/main" xmlns:r="http://schemas.openxmlformats.org/officeDocument/2006/relationships" xmlns:p="http://schemas.openxmlformats.org/presentationml/2006/main">
+  <p:cSld>
+    <p:spTree>
+      <p:nvGrpSpPr>
+        <p:cNvPr id="1" name=""/>
+        <p:cNvGrpSpPr/>
+        <p:nvPr/>
+      </p:nvGrpSpPr>
+      <p:grpSpPr>
+        <a:xfrm>
+          <a:off x="0" y="0"/>
+          <a:ext cx="0" cy="0"/>
+          <a:chOff x="0" y="0"/>
+          <a:chExt cx="0" cy="0"/>
+        </a:xfrm>
+      </p:grpSpPr>
+      <p:sp>
+        <p:nvSpPr>
+          <p:cNvPr id="2" name="Folienbildplatzhalter 1"/>
+          <p:cNvSpPr>
+            <a:spLocks noGrp="1" noRot="1" noChangeAspect="1"/>
+          </p:cNvSpPr>
+          <p:nvPr>
+            <p:ph type="sldImg"/>
+          </p:nvPr>
+        </p:nvSpPr>
+        <p:spPr/>
+      </p:sp>
+      <p:sp>
+        <p:nvSpPr>
+          <p:cNvPr id="3" name="Notizenplatzhalter 2"/>
+          <p:cNvSpPr>
+            <a:spLocks noGrp="1"/>
+          </p:cNvSpPr>
+          <p:nvPr>
+            <p:ph type="body" idx="1"/>
+          </p:nvPr>
+        </p:nvSpPr>
+        <p:spPr/>
+        <p:txBody>
+          <a:bodyPr/>
+          <a:lstStyle/>
+          <a:p>
+            <a:endParaRPr lang="de-DE" dirty="0"/>
+          </a:p>
+        </p:txBody>
+      </p:sp>
+      <p:sp>
+        <p:nvSpPr>
+          <p:cNvPr id="4" name="Foliennummernplatzhalter 3"/>
+          <p:cNvSpPr>
+            <a:spLocks noGrp="1"/>
+          </p:cNvSpPr>
+          <p:nvPr>
+            <p:ph type="sldNum" sz="quarter" idx="5"/>
+          </p:nvPr>
+        </p:nvSpPr>
+        <p:spPr/>
+        <p:txBody>
+          <a:bodyPr/>
+          <a:lstStyle/>
+          <a:p>
+            <a:fld id="{816B0314-5404-4379-B6CE-A704F6E72D4C}" type="slidenum">
+              <a:rPr lang="de-DE" smtClean="0"/>
+              <a:t>14</a:t>
+            </a:fld>
+            <a:endParaRPr lang="de-DE"/>
+          </a:p>
+        </p:txBody>
+      </p:sp>
+    </p:spTree>
+    <p:extLst>
+      <p:ext uri="{BB962C8B-B14F-4D97-AF65-F5344CB8AC3E}">
+        <p14:creationId xmlns:p14="http://schemas.microsoft.com/office/powerpoint/2010/main" val="1084104474"/>
+      </p:ext>
+    </p:extLst>
+  </p:cSld>
+  <p:clrMapOvr>
+    <a:masterClrMapping/>
+  </p:clrMapOvr>
+</p:notes>
+</file>
+
 <file path=ppt/slideLayouts/slideLayout1.xml><?xml version="1.0" encoding="utf-8"?>
 <p:sldLayout xmlns:a="http://schemas.openxmlformats.org/drawingml/2006/main" xmlns:r="http://schemas.openxmlformats.org/officeDocument/2006/relationships" xmlns:p="http://schemas.openxmlformats.org/presentationml/2006/main" showMasterSp="0" type="title" preserve="1">
   <p:cSld name="Titelfolie">
@@ -788,7 +878,7 @@
             <a:fld id="{6EBD23FA-E2C1-42AD-9F8D-C09890A4006B}" type="datetimeFigureOut">
               <a:rPr lang="de-DE" smtClean="0"/>
               <a:pPr/>
-              <a:t>20.12.2022</a:t>
+              <a:t>08.01.2023</a:t>
             </a:fld>
             <a:endParaRPr lang="de-DE"/>
           </a:p>
@@ -982,7 +1072,7 @@
             <a:fld id="{6EBD23FA-E2C1-42AD-9F8D-C09890A4006B}" type="datetimeFigureOut">
               <a:rPr lang="de-DE" smtClean="0"/>
               <a:pPr/>
-              <a:t>20.12.2022</a:t>
+              <a:t>08.01.2023</a:t>
             </a:fld>
             <a:endParaRPr lang="de-DE"/>
           </a:p>
@@ -1164,7 +1254,7 @@
             <a:fld id="{6EBD23FA-E2C1-42AD-9F8D-C09890A4006B}" type="datetimeFigureOut">
               <a:rPr lang="de-DE" smtClean="0"/>
               <a:pPr/>
-              <a:t>20.12.2022</a:t>
+              <a:t>08.01.2023</a:t>
             </a:fld>
             <a:endParaRPr lang="de-DE"/>
           </a:p>
@@ -1336,7 +1426,7 @@
             <a:fld id="{6EBD23FA-E2C1-42AD-9F8D-C09890A4006B}" type="datetimeFigureOut">
               <a:rPr lang="de-DE" smtClean="0"/>
               <a:pPr/>
-              <a:t>20.12.2022</a:t>
+              <a:t>08.01.2023</a:t>
             </a:fld>
             <a:endParaRPr lang="de-DE"/>
           </a:p>
@@ -1592,7 +1682,7 @@
             <a:fld id="{6EBD23FA-E2C1-42AD-9F8D-C09890A4006B}" type="datetimeFigureOut">
               <a:rPr lang="de-DE" smtClean="0"/>
               <a:pPr/>
-              <a:t>20.12.2022</a:t>
+              <a:t>08.01.2023</a:t>
             </a:fld>
             <a:endParaRPr lang="de-DE"/>
           </a:p>
@@ -1920,7 +2010,7 @@
             <a:fld id="{6EBD23FA-E2C1-42AD-9F8D-C09890A4006B}" type="datetimeFigureOut">
               <a:rPr lang="de-DE" smtClean="0"/>
               <a:pPr/>
-              <a:t>20.12.2022</a:t>
+              <a:t>08.01.2023</a:t>
             </a:fld>
             <a:endParaRPr lang="de-DE"/>
           </a:p>
@@ -2342,7 +2432,7 @@
             <a:fld id="{6EBD23FA-E2C1-42AD-9F8D-C09890A4006B}" type="datetimeFigureOut">
               <a:rPr lang="de-DE" smtClean="0"/>
               <a:pPr/>
-              <a:t>20.12.2022</a:t>
+              <a:t>08.01.2023</a:t>
             </a:fld>
             <a:endParaRPr lang="de-DE"/>
           </a:p>
@@ -2462,7 +2552,7 @@
             <a:fld id="{6EBD23FA-E2C1-42AD-9F8D-C09890A4006B}" type="datetimeFigureOut">
               <a:rPr lang="de-DE" smtClean="0"/>
               <a:pPr/>
-              <a:t>20.12.2022</a:t>
+              <a:t>08.01.2023</a:t>
             </a:fld>
             <a:endParaRPr lang="de-DE"/>
           </a:p>
@@ -2559,7 +2649,7 @@
             <a:fld id="{6EBD23FA-E2C1-42AD-9F8D-C09890A4006B}" type="datetimeFigureOut">
               <a:rPr lang="de-DE" smtClean="0"/>
               <a:pPr/>
-              <a:t>20.12.2022</a:t>
+              <a:t>08.01.2023</a:t>
             </a:fld>
             <a:endParaRPr lang="de-DE"/>
           </a:p>
@@ -2848,7 +2938,7 @@
             <a:fld id="{6EBD23FA-E2C1-42AD-9F8D-C09890A4006B}" type="datetimeFigureOut">
               <a:rPr lang="de-DE" smtClean="0"/>
               <a:pPr/>
-              <a:t>20.12.2022</a:t>
+              <a:t>08.01.2023</a:t>
             </a:fld>
             <a:endParaRPr lang="de-DE"/>
           </a:p>
@@ -3172,7 +3262,7 @@
             <a:fld id="{6EBD23FA-E2C1-42AD-9F8D-C09890A4006B}" type="datetimeFigureOut">
               <a:rPr lang="de-DE" smtClean="0"/>
               <a:pPr/>
-              <a:t>20.12.2022</a:t>
+              <a:t>08.01.2023</a:t>
             </a:fld>
             <a:endParaRPr lang="de-DE"/>
           </a:p>
@@ -3428,7 +3518,7 @@
             <a:fld id="{6EBD23FA-E2C1-42AD-9F8D-C09890A4006B}" type="datetimeFigureOut">
               <a:rPr lang="de-DE" smtClean="0"/>
               <a:pPr/>
-              <a:t>20.12.2022</a:t>
+              <a:t>08.01.2023</a:t>
             </a:fld>
             <a:endParaRPr lang="de-DE"/>
           </a:p>
@@ -4012,6 +4102,2239 @@
         </p:spPr>
       </p:pic>
     </p:spTree>
+  </p:cSld>
+  <p:clrMapOvr>
+    <a:masterClrMapping/>
+  </p:clrMapOvr>
+</p:sld>
+</file>
+
+<file path=ppt/slides/slide10.xml><?xml version="1.0" encoding="utf-8"?>
+<p:sld xmlns:a="http://schemas.openxmlformats.org/drawingml/2006/main" xmlns:r="http://schemas.openxmlformats.org/officeDocument/2006/relationships" xmlns:p="http://schemas.openxmlformats.org/presentationml/2006/main">
+  <p:cSld>
+    <p:spTree>
+      <p:nvGrpSpPr>
+        <p:cNvPr id="1" name=""/>
+        <p:cNvGrpSpPr/>
+        <p:nvPr/>
+      </p:nvGrpSpPr>
+      <p:grpSpPr>
+        <a:xfrm>
+          <a:off x="0" y="0"/>
+          <a:ext cx="0" cy="0"/>
+          <a:chOff x="0" y="0"/>
+          <a:chExt cx="0" cy="0"/>
+        </a:xfrm>
+      </p:grpSpPr>
+      <p:sp>
+        <p:nvSpPr>
+          <p:cNvPr id="4" name="Titel 3">
+            <a:extLst>
+              <a:ext uri="{FF2B5EF4-FFF2-40B4-BE49-F238E27FC236}">
+                <a16:creationId xmlns:a16="http://schemas.microsoft.com/office/drawing/2014/main" id="{28BE2B57-CD47-284A-624C-3D849B7D26A1}"/>
+              </a:ext>
+            </a:extLst>
+          </p:cNvPr>
+          <p:cNvSpPr>
+            <a:spLocks noGrp="1"/>
+          </p:cNvSpPr>
+          <p:nvPr>
+            <p:ph type="ctrTitle"/>
+          </p:nvPr>
+        </p:nvSpPr>
+        <p:spPr/>
+        <p:txBody>
+          <a:bodyPr/>
+          <a:lstStyle/>
+          <a:p>
+            <a:r>
+              <a:rPr lang="de-DE" dirty="0"/>
+              <a:t>Kommunikation</a:t>
+            </a:r>
+          </a:p>
+        </p:txBody>
+      </p:sp>
+    </p:spTree>
+    <p:extLst>
+      <p:ext uri="{BB962C8B-B14F-4D97-AF65-F5344CB8AC3E}">
+        <p14:creationId xmlns:p14="http://schemas.microsoft.com/office/powerpoint/2010/main" val="3330908451"/>
+      </p:ext>
+    </p:extLst>
+  </p:cSld>
+  <p:clrMapOvr>
+    <a:masterClrMapping/>
+  </p:clrMapOvr>
+</p:sld>
+</file>
+
+<file path=ppt/slides/slide11.xml><?xml version="1.0" encoding="utf-8"?>
+<p:sld xmlns:a="http://schemas.openxmlformats.org/drawingml/2006/main" xmlns:r="http://schemas.openxmlformats.org/officeDocument/2006/relationships" xmlns:p="http://schemas.openxmlformats.org/presentationml/2006/main">
+  <p:cSld>
+    <p:spTree>
+      <p:nvGrpSpPr>
+        <p:cNvPr id="1" name=""/>
+        <p:cNvGrpSpPr/>
+        <p:nvPr/>
+      </p:nvGrpSpPr>
+      <p:grpSpPr>
+        <a:xfrm>
+          <a:off x="0" y="0"/>
+          <a:ext cx="0" cy="0"/>
+          <a:chOff x="0" y="0"/>
+          <a:chExt cx="0" cy="0"/>
+        </a:xfrm>
+      </p:grpSpPr>
+      <p:sp>
+        <p:nvSpPr>
+          <p:cNvPr id="4" name="Titel 3">
+            <a:extLst>
+              <a:ext uri="{FF2B5EF4-FFF2-40B4-BE49-F238E27FC236}">
+                <a16:creationId xmlns:a16="http://schemas.microsoft.com/office/drawing/2014/main" id="{5005CB37-04A1-1FCB-9B05-BBBAF39E535F}"/>
+              </a:ext>
+            </a:extLst>
+          </p:cNvPr>
+          <p:cNvSpPr>
+            <a:spLocks noGrp="1"/>
+          </p:cNvSpPr>
+          <p:nvPr>
+            <p:ph type="title"/>
+          </p:nvPr>
+        </p:nvSpPr>
+        <p:spPr/>
+        <p:txBody>
+          <a:bodyPr/>
+          <a:lstStyle/>
+          <a:p>
+            <a:r>
+              <a:rPr lang="de-DE" dirty="0"/>
+              <a:t>Man-in-</a:t>
+            </a:r>
+            <a:r>
+              <a:rPr lang="de-DE" dirty="0" err="1"/>
+              <a:t>the</a:t>
+            </a:r>
+            <a:r>
+              <a:rPr lang="de-DE" dirty="0"/>
+              <a:t>-Middle-Angriff</a:t>
+            </a:r>
+          </a:p>
+        </p:txBody>
+      </p:sp>
+      <p:sp>
+        <p:nvSpPr>
+          <p:cNvPr id="3" name="Freihandform: Form 2">
+            <a:extLst>
+              <a:ext uri="{FF2B5EF4-FFF2-40B4-BE49-F238E27FC236}">
+                <a16:creationId xmlns:a16="http://schemas.microsoft.com/office/drawing/2014/main" id="{4E8A2D3C-54D0-3E81-C3F7-9B0B3D5C0CBA}"/>
+              </a:ext>
+            </a:extLst>
+          </p:cNvPr>
+          <p:cNvSpPr/>
+          <p:nvPr/>
+        </p:nvSpPr>
+        <p:spPr>
+          <a:xfrm>
+            <a:off x="946404" y="1877769"/>
+            <a:ext cx="6446520" cy="1352520"/>
+          </a:xfrm>
+          <a:custGeom>
+            <a:avLst/>
+            <a:gdLst>
+              <a:gd name="connsiteX0" fmla="*/ 0 w 6446520"/>
+              <a:gd name="connsiteY0" fmla="*/ 225425 h 1352520"/>
+              <a:gd name="connsiteX1" fmla="*/ 225425 w 6446520"/>
+              <a:gd name="connsiteY1" fmla="*/ 0 h 1352520"/>
+              <a:gd name="connsiteX2" fmla="*/ 6221095 w 6446520"/>
+              <a:gd name="connsiteY2" fmla="*/ 0 h 1352520"/>
+              <a:gd name="connsiteX3" fmla="*/ 6446520 w 6446520"/>
+              <a:gd name="connsiteY3" fmla="*/ 225425 h 1352520"/>
+              <a:gd name="connsiteX4" fmla="*/ 6446520 w 6446520"/>
+              <a:gd name="connsiteY4" fmla="*/ 1127095 h 1352520"/>
+              <a:gd name="connsiteX5" fmla="*/ 6221095 w 6446520"/>
+              <a:gd name="connsiteY5" fmla="*/ 1352520 h 1352520"/>
+              <a:gd name="connsiteX6" fmla="*/ 225425 w 6446520"/>
+              <a:gd name="connsiteY6" fmla="*/ 1352520 h 1352520"/>
+              <a:gd name="connsiteX7" fmla="*/ 0 w 6446520"/>
+              <a:gd name="connsiteY7" fmla="*/ 1127095 h 1352520"/>
+              <a:gd name="connsiteX8" fmla="*/ 0 w 6446520"/>
+              <a:gd name="connsiteY8" fmla="*/ 225425 h 1352520"/>
+            </a:gdLst>
+            <a:ahLst/>
+            <a:cxnLst>
+              <a:cxn ang="0">
+                <a:pos x="connsiteX0" y="connsiteY0"/>
+              </a:cxn>
+              <a:cxn ang="0">
+                <a:pos x="connsiteX1" y="connsiteY1"/>
+              </a:cxn>
+              <a:cxn ang="0">
+                <a:pos x="connsiteX2" y="connsiteY2"/>
+              </a:cxn>
+              <a:cxn ang="0">
+                <a:pos x="connsiteX3" y="connsiteY3"/>
+              </a:cxn>
+              <a:cxn ang="0">
+                <a:pos x="connsiteX4" y="connsiteY4"/>
+              </a:cxn>
+              <a:cxn ang="0">
+                <a:pos x="connsiteX5" y="connsiteY5"/>
+              </a:cxn>
+              <a:cxn ang="0">
+                <a:pos x="connsiteX6" y="connsiteY6"/>
+              </a:cxn>
+              <a:cxn ang="0">
+                <a:pos x="connsiteX7" y="connsiteY7"/>
+              </a:cxn>
+              <a:cxn ang="0">
+                <a:pos x="connsiteX8" y="connsiteY8"/>
+              </a:cxn>
+            </a:cxnLst>
+            <a:rect l="l" t="t" r="r" b="b"/>
+            <a:pathLst>
+              <a:path w="6446520" h="1352520">
+                <a:moveTo>
+                  <a:pt x="0" y="225425"/>
+                </a:moveTo>
+                <a:cubicBezTo>
+                  <a:pt x="0" y="100926"/>
+                  <a:pt x="100926" y="0"/>
+                  <a:pt x="225425" y="0"/>
+                </a:cubicBezTo>
+                <a:lnTo>
+                  <a:pt x="6221095" y="0"/>
+                </a:lnTo>
+                <a:cubicBezTo>
+                  <a:pt x="6345594" y="0"/>
+                  <a:pt x="6446520" y="100926"/>
+                  <a:pt x="6446520" y="225425"/>
+                </a:cubicBezTo>
+                <a:lnTo>
+                  <a:pt x="6446520" y="1127095"/>
+                </a:lnTo>
+                <a:cubicBezTo>
+                  <a:pt x="6446520" y="1251594"/>
+                  <a:pt x="6345594" y="1352520"/>
+                  <a:pt x="6221095" y="1352520"/>
+                </a:cubicBezTo>
+                <a:lnTo>
+                  <a:pt x="225425" y="1352520"/>
+                </a:lnTo>
+                <a:cubicBezTo>
+                  <a:pt x="100926" y="1352520"/>
+                  <a:pt x="0" y="1251594"/>
+                  <a:pt x="0" y="1127095"/>
+                </a:cubicBezTo>
+                <a:lnTo>
+                  <a:pt x="0" y="225425"/>
+                </a:lnTo>
+                <a:close/>
+              </a:path>
+            </a:pathLst>
+          </a:custGeom>
+        </p:spPr>
+        <p:style>
+          <a:lnRef idx="2">
+            <a:schemeClr val="lt1">
+              <a:hueOff val="0"/>
+              <a:satOff val="0"/>
+              <a:lumOff val="0"/>
+              <a:alphaOff val="0"/>
+            </a:schemeClr>
+          </a:lnRef>
+          <a:fillRef idx="1">
+            <a:schemeClr val="accent1">
+              <a:hueOff val="0"/>
+              <a:satOff val="0"/>
+              <a:lumOff val="0"/>
+              <a:alphaOff val="0"/>
+            </a:schemeClr>
+          </a:fillRef>
+          <a:effectRef idx="0">
+            <a:schemeClr val="accent1">
+              <a:hueOff val="0"/>
+              <a:satOff val="0"/>
+              <a:lumOff val="0"/>
+              <a:alphaOff val="0"/>
+            </a:schemeClr>
+          </a:effectRef>
+          <a:fontRef idx="minor">
+            <a:schemeClr val="lt1"/>
+          </a:fontRef>
+        </p:style>
+        <p:txBody>
+          <a:bodyPr spcFirstLastPara="0" vert="horz" wrap="square" lIns="195565" tIns="195565" rIns="195565" bIns="195565" numCol="1" spcCol="1270" anchor="ctr" anchorCtr="0">
+            <a:noAutofit/>
+          </a:bodyPr>
+          <a:lstStyle/>
+          <a:p>
+            <a:pPr marL="0" lvl="0" indent="0" algn="l" defTabSz="1511300">
+              <a:lnSpc>
+                <a:spcPct val="90000"/>
+              </a:lnSpc>
+              <a:spcBef>
+                <a:spcPct val="0"/>
+              </a:spcBef>
+              <a:spcAft>
+                <a:spcPct val="35000"/>
+              </a:spcAft>
+              <a:buNone/>
+            </a:pPr>
+            <a:r>
+              <a:rPr lang="de-DE" sz="3400" kern="1200" baseline="0" dirty="0"/>
+              <a:t>Unverschlüsselte Übertragung</a:t>
+            </a:r>
+            <a:endParaRPr lang="en-US" sz="3400" kern="1200" dirty="0"/>
+          </a:p>
+        </p:txBody>
+      </p:sp>
+      <p:sp>
+        <p:nvSpPr>
+          <p:cNvPr id="5" name="Freihandform: Form 4">
+            <a:extLst>
+              <a:ext uri="{FF2B5EF4-FFF2-40B4-BE49-F238E27FC236}">
+                <a16:creationId xmlns:a16="http://schemas.microsoft.com/office/drawing/2014/main" id="{3C601319-2561-66C6-C28B-AF68E7B01483}"/>
+              </a:ext>
+            </a:extLst>
+          </p:cNvPr>
+          <p:cNvSpPr/>
+          <p:nvPr/>
+        </p:nvSpPr>
+        <p:spPr>
+          <a:xfrm>
+            <a:off x="946404" y="3328209"/>
+            <a:ext cx="6446520" cy="1352520"/>
+          </a:xfrm>
+          <a:custGeom>
+            <a:avLst/>
+            <a:gdLst>
+              <a:gd name="connsiteX0" fmla="*/ 0 w 6446520"/>
+              <a:gd name="connsiteY0" fmla="*/ 225425 h 1352520"/>
+              <a:gd name="connsiteX1" fmla="*/ 225425 w 6446520"/>
+              <a:gd name="connsiteY1" fmla="*/ 0 h 1352520"/>
+              <a:gd name="connsiteX2" fmla="*/ 6221095 w 6446520"/>
+              <a:gd name="connsiteY2" fmla="*/ 0 h 1352520"/>
+              <a:gd name="connsiteX3" fmla="*/ 6446520 w 6446520"/>
+              <a:gd name="connsiteY3" fmla="*/ 225425 h 1352520"/>
+              <a:gd name="connsiteX4" fmla="*/ 6446520 w 6446520"/>
+              <a:gd name="connsiteY4" fmla="*/ 1127095 h 1352520"/>
+              <a:gd name="connsiteX5" fmla="*/ 6221095 w 6446520"/>
+              <a:gd name="connsiteY5" fmla="*/ 1352520 h 1352520"/>
+              <a:gd name="connsiteX6" fmla="*/ 225425 w 6446520"/>
+              <a:gd name="connsiteY6" fmla="*/ 1352520 h 1352520"/>
+              <a:gd name="connsiteX7" fmla="*/ 0 w 6446520"/>
+              <a:gd name="connsiteY7" fmla="*/ 1127095 h 1352520"/>
+              <a:gd name="connsiteX8" fmla="*/ 0 w 6446520"/>
+              <a:gd name="connsiteY8" fmla="*/ 225425 h 1352520"/>
+            </a:gdLst>
+            <a:ahLst/>
+            <a:cxnLst>
+              <a:cxn ang="0">
+                <a:pos x="connsiteX0" y="connsiteY0"/>
+              </a:cxn>
+              <a:cxn ang="0">
+                <a:pos x="connsiteX1" y="connsiteY1"/>
+              </a:cxn>
+              <a:cxn ang="0">
+                <a:pos x="connsiteX2" y="connsiteY2"/>
+              </a:cxn>
+              <a:cxn ang="0">
+                <a:pos x="connsiteX3" y="connsiteY3"/>
+              </a:cxn>
+              <a:cxn ang="0">
+                <a:pos x="connsiteX4" y="connsiteY4"/>
+              </a:cxn>
+              <a:cxn ang="0">
+                <a:pos x="connsiteX5" y="connsiteY5"/>
+              </a:cxn>
+              <a:cxn ang="0">
+                <a:pos x="connsiteX6" y="connsiteY6"/>
+              </a:cxn>
+              <a:cxn ang="0">
+                <a:pos x="connsiteX7" y="connsiteY7"/>
+              </a:cxn>
+              <a:cxn ang="0">
+                <a:pos x="connsiteX8" y="connsiteY8"/>
+              </a:cxn>
+            </a:cxnLst>
+            <a:rect l="l" t="t" r="r" b="b"/>
+            <a:pathLst>
+              <a:path w="6446520" h="1352520">
+                <a:moveTo>
+                  <a:pt x="0" y="225425"/>
+                </a:moveTo>
+                <a:cubicBezTo>
+                  <a:pt x="0" y="100926"/>
+                  <a:pt x="100926" y="0"/>
+                  <a:pt x="225425" y="0"/>
+                </a:cubicBezTo>
+                <a:lnTo>
+                  <a:pt x="6221095" y="0"/>
+                </a:lnTo>
+                <a:cubicBezTo>
+                  <a:pt x="6345594" y="0"/>
+                  <a:pt x="6446520" y="100926"/>
+                  <a:pt x="6446520" y="225425"/>
+                </a:cubicBezTo>
+                <a:lnTo>
+                  <a:pt x="6446520" y="1127095"/>
+                </a:lnTo>
+                <a:cubicBezTo>
+                  <a:pt x="6446520" y="1251594"/>
+                  <a:pt x="6345594" y="1352520"/>
+                  <a:pt x="6221095" y="1352520"/>
+                </a:cubicBezTo>
+                <a:lnTo>
+                  <a:pt x="225425" y="1352520"/>
+                </a:lnTo>
+                <a:cubicBezTo>
+                  <a:pt x="100926" y="1352520"/>
+                  <a:pt x="0" y="1251594"/>
+                  <a:pt x="0" y="1127095"/>
+                </a:cubicBezTo>
+                <a:lnTo>
+                  <a:pt x="0" y="225425"/>
+                </a:lnTo>
+                <a:close/>
+              </a:path>
+            </a:pathLst>
+          </a:custGeom>
+        </p:spPr>
+        <p:style>
+          <a:lnRef idx="2">
+            <a:schemeClr val="lt1">
+              <a:hueOff val="0"/>
+              <a:satOff val="0"/>
+              <a:lumOff val="0"/>
+              <a:alphaOff val="0"/>
+            </a:schemeClr>
+          </a:lnRef>
+          <a:fillRef idx="1">
+            <a:schemeClr val="accent1">
+              <a:hueOff val="0"/>
+              <a:satOff val="0"/>
+              <a:lumOff val="0"/>
+              <a:alphaOff val="0"/>
+            </a:schemeClr>
+          </a:fillRef>
+          <a:effectRef idx="0">
+            <a:schemeClr val="accent1">
+              <a:hueOff val="0"/>
+              <a:satOff val="0"/>
+              <a:lumOff val="0"/>
+              <a:alphaOff val="0"/>
+            </a:schemeClr>
+          </a:effectRef>
+          <a:fontRef idx="minor">
+            <a:schemeClr val="lt1"/>
+          </a:fontRef>
+        </p:style>
+        <p:txBody>
+          <a:bodyPr spcFirstLastPara="0" vert="horz" wrap="square" lIns="195565" tIns="195565" rIns="195565" bIns="195565" numCol="1" spcCol="1270" anchor="ctr" anchorCtr="0">
+            <a:noAutofit/>
+          </a:bodyPr>
+          <a:lstStyle/>
+          <a:p>
+            <a:pPr marL="0" lvl="0" indent="0" algn="l" defTabSz="1511300">
+              <a:lnSpc>
+                <a:spcPct val="90000"/>
+              </a:lnSpc>
+              <a:spcBef>
+                <a:spcPct val="0"/>
+              </a:spcBef>
+              <a:spcAft>
+                <a:spcPct val="35000"/>
+              </a:spcAft>
+              <a:buNone/>
+            </a:pPr>
+            <a:r>
+              <a:rPr lang="de-DE" sz="3400" kern="1200" baseline="0" dirty="0"/>
+              <a:t>Kein Integritätsschutz</a:t>
+            </a:r>
+            <a:endParaRPr lang="en-US" sz="3400" kern="1200" dirty="0"/>
+          </a:p>
+        </p:txBody>
+      </p:sp>
+    </p:spTree>
+    <p:extLst>
+      <p:ext uri="{BB962C8B-B14F-4D97-AF65-F5344CB8AC3E}">
+        <p14:creationId xmlns:p14="http://schemas.microsoft.com/office/powerpoint/2010/main" val="2109951190"/>
+      </p:ext>
+    </p:extLst>
+  </p:cSld>
+  <p:clrMapOvr>
+    <a:masterClrMapping/>
+  </p:clrMapOvr>
+  <p:timing>
+    <p:tnLst>
+      <p:par>
+        <p:cTn id="1" dur="indefinite" restart="never" nodeType="tmRoot">
+          <p:childTnLst>
+            <p:seq concurrent="1" nextAc="seek">
+              <p:cTn id="2" dur="indefinite" nodeType="mainSeq">
+                <p:childTnLst>
+                  <p:par>
+                    <p:cTn id="3" fill="hold">
+                      <p:stCondLst>
+                        <p:cond delay="indefinite"/>
+                      </p:stCondLst>
+                      <p:childTnLst>
+                        <p:par>
+                          <p:cTn id="4" fill="hold">
+                            <p:stCondLst>
+                              <p:cond delay="0"/>
+                            </p:stCondLst>
+                            <p:childTnLst>
+                              <p:par>
+                                <p:cTn id="5" presetID="10" presetClass="entr" presetSubtype="0" fill="hold" grpId="0" nodeType="clickEffect">
+                                  <p:stCondLst>
+                                    <p:cond delay="0"/>
+                                  </p:stCondLst>
+                                  <p:childTnLst>
+                                    <p:set>
+                                      <p:cBhvr>
+                                        <p:cTn id="6" dur="1" fill="hold">
+                                          <p:stCondLst>
+                                            <p:cond delay="0"/>
+                                          </p:stCondLst>
+                                        </p:cTn>
+                                        <p:tgtEl>
+                                          <p:spTgt spid="3"/>
+                                        </p:tgtEl>
+                                        <p:attrNameLst>
+                                          <p:attrName>style.visibility</p:attrName>
+                                        </p:attrNameLst>
+                                      </p:cBhvr>
+                                      <p:to>
+                                        <p:strVal val="visible"/>
+                                      </p:to>
+                                    </p:set>
+                                    <p:animEffect transition="in" filter="fade">
+                                      <p:cBhvr>
+                                        <p:cTn id="7" dur="500"/>
+                                        <p:tgtEl>
+                                          <p:spTgt spid="3"/>
+                                        </p:tgtEl>
+                                      </p:cBhvr>
+                                    </p:animEffect>
+                                  </p:childTnLst>
+                                </p:cTn>
+                              </p:par>
+                            </p:childTnLst>
+                          </p:cTn>
+                        </p:par>
+                      </p:childTnLst>
+                    </p:cTn>
+                  </p:par>
+                  <p:par>
+                    <p:cTn id="8" fill="hold">
+                      <p:stCondLst>
+                        <p:cond delay="indefinite"/>
+                      </p:stCondLst>
+                      <p:childTnLst>
+                        <p:par>
+                          <p:cTn id="9" fill="hold">
+                            <p:stCondLst>
+                              <p:cond delay="0"/>
+                            </p:stCondLst>
+                            <p:childTnLst>
+                              <p:par>
+                                <p:cTn id="10" presetID="10" presetClass="entr" presetSubtype="0" fill="hold" grpId="0" nodeType="clickEffect">
+                                  <p:stCondLst>
+                                    <p:cond delay="0"/>
+                                  </p:stCondLst>
+                                  <p:childTnLst>
+                                    <p:set>
+                                      <p:cBhvr>
+                                        <p:cTn id="11" dur="1" fill="hold">
+                                          <p:stCondLst>
+                                            <p:cond delay="0"/>
+                                          </p:stCondLst>
+                                        </p:cTn>
+                                        <p:tgtEl>
+                                          <p:spTgt spid="5"/>
+                                        </p:tgtEl>
+                                        <p:attrNameLst>
+                                          <p:attrName>style.visibility</p:attrName>
+                                        </p:attrNameLst>
+                                      </p:cBhvr>
+                                      <p:to>
+                                        <p:strVal val="visible"/>
+                                      </p:to>
+                                    </p:set>
+                                    <p:animEffect transition="in" filter="fade">
+                                      <p:cBhvr>
+                                        <p:cTn id="12" dur="500"/>
+                                        <p:tgtEl>
+                                          <p:spTgt spid="5"/>
+                                        </p:tgtEl>
+                                      </p:cBhvr>
+                                    </p:animEffect>
+                                  </p:childTnLst>
+                                </p:cTn>
+                              </p:par>
+                            </p:childTnLst>
+                          </p:cTn>
+                        </p:par>
+                      </p:childTnLst>
+                    </p:cTn>
+                  </p:par>
+                </p:childTnLst>
+              </p:cTn>
+              <p:prevCondLst>
+                <p:cond evt="onPrev" delay="0">
+                  <p:tgtEl>
+                    <p:sldTgt/>
+                  </p:tgtEl>
+                </p:cond>
+              </p:prevCondLst>
+              <p:nextCondLst>
+                <p:cond evt="onNext" delay="0">
+                  <p:tgtEl>
+                    <p:sldTgt/>
+                  </p:tgtEl>
+                </p:cond>
+              </p:nextCondLst>
+            </p:seq>
+          </p:childTnLst>
+        </p:cTn>
+      </p:par>
+    </p:tnLst>
+    <p:bldLst>
+      <p:bldP spid="3" grpId="0" animBg="1"/>
+      <p:bldP spid="5" grpId="0" animBg="1"/>
+    </p:bldLst>
+  </p:timing>
+</p:sld>
+</file>
+
+<file path=ppt/slides/slide12.xml><?xml version="1.0" encoding="utf-8"?>
+<p:sld xmlns:a="http://schemas.openxmlformats.org/drawingml/2006/main" xmlns:r="http://schemas.openxmlformats.org/officeDocument/2006/relationships" xmlns:p="http://schemas.openxmlformats.org/presentationml/2006/main">
+  <p:cSld>
+    <p:bg>
+      <p:bgPr>
+        <a:solidFill>
+          <a:schemeClr val="bg1"/>
+        </a:solidFill>
+        <a:effectLst/>
+      </p:bgPr>
+    </p:bg>
+    <p:spTree>
+      <p:nvGrpSpPr>
+        <p:cNvPr id="1" name=""/>
+        <p:cNvGrpSpPr/>
+        <p:nvPr/>
+      </p:nvGrpSpPr>
+      <p:grpSpPr>
+        <a:xfrm>
+          <a:off x="0" y="0"/>
+          <a:ext cx="0" cy="0"/>
+          <a:chOff x="0" y="0"/>
+          <a:chExt cx="0" cy="0"/>
+        </a:xfrm>
+      </p:grpSpPr>
+      <p:sp>
+        <p:nvSpPr>
+          <p:cNvPr id="10" name="Rectangle 9">
+            <a:extLst>
+              <a:ext uri="{FF2B5EF4-FFF2-40B4-BE49-F238E27FC236}">
+                <a16:creationId xmlns:a16="http://schemas.microsoft.com/office/drawing/2014/main" id="{5D5E0904-721C-4D68-9EB8-1C9752E329A7}"/>
+              </a:ext>
+              <a:ext uri="{C183D7F6-B498-43B3-948B-1728B52AA6E4}">
+                <adec:decorative xmlns:adec="http://schemas.microsoft.com/office/drawing/2017/decorative" val="1"/>
+              </a:ext>
+            </a:extLst>
+          </p:cNvPr>
+          <p:cNvSpPr>
+            <a:spLocks noGrp="1" noRot="1" noChangeAspect="1" noMove="1" noResize="1" noEditPoints="1" noAdjustHandles="1" noChangeArrowheads="1" noChangeShapeType="1" noTextEdit="1"/>
+          </p:cNvSpPr>
+          <p:nvPr>
+            <p:extLst>
+              <p:ext uri="{386F3935-93C4-4BCD-93E2-E3B085C9AB24}">
+                <p16:designElem xmlns:p16="http://schemas.microsoft.com/office/powerpoint/2015/main" val="1"/>
+              </p:ext>
+            </p:extLst>
+          </p:nvPr>
+        </p:nvSpPr>
+        <p:spPr>
+          <a:xfrm>
+            <a:off x="0" y="0"/>
+            <a:ext cx="342900" cy="6858000"/>
+          </a:xfrm>
+          <a:prstGeom prst="rect">
+            <a:avLst/>
+          </a:prstGeom>
+          <a:solidFill>
+            <a:schemeClr val="accent1"/>
+          </a:solidFill>
+          <a:ln>
+            <a:noFill/>
+          </a:ln>
+        </p:spPr>
+        <p:style>
+          <a:lnRef idx="2">
+            <a:schemeClr val="accent1">
+              <a:shade val="50000"/>
+            </a:schemeClr>
+          </a:lnRef>
+          <a:fillRef idx="1">
+            <a:schemeClr val="accent1"/>
+          </a:fillRef>
+          <a:effectRef idx="0">
+            <a:schemeClr val="accent1"/>
+          </a:effectRef>
+          <a:fontRef idx="minor">
+            <a:schemeClr val="lt1"/>
+          </a:fontRef>
+        </p:style>
+      </p:sp>
+      <p:sp useBgFill="1">
+        <p:nvSpPr>
+          <p:cNvPr id="12" name="Rectangle 11">
+            <a:extLst>
+              <a:ext uri="{FF2B5EF4-FFF2-40B4-BE49-F238E27FC236}">
+                <a16:creationId xmlns:a16="http://schemas.microsoft.com/office/drawing/2014/main" id="{D0CDF5D3-7220-42A0-9D37-ECF3BF283B37}"/>
+              </a:ext>
+              <a:ext uri="{C183D7F6-B498-43B3-948B-1728B52AA6E4}">
+                <adec:decorative xmlns:adec="http://schemas.microsoft.com/office/drawing/2017/decorative" val="1"/>
+              </a:ext>
+            </a:extLst>
+          </p:cNvPr>
+          <p:cNvSpPr>
+            <a:spLocks noGrp="1" noRot="1" noChangeAspect="1" noMove="1" noResize="1" noEditPoints="1" noAdjustHandles="1" noChangeArrowheads="1" noChangeShapeType="1" noTextEdit="1"/>
+          </p:cNvSpPr>
+          <p:nvPr>
+            <p:extLst>
+              <p:ext uri="{386F3935-93C4-4BCD-93E2-E3B085C9AB24}">
+                <p16:designElem xmlns:p16="http://schemas.microsoft.com/office/powerpoint/2015/main" val="1"/>
+              </p:ext>
+            </p:extLst>
+          </p:nvPr>
+        </p:nvSpPr>
+        <p:spPr>
+          <a:xfrm>
+            <a:off x="342900" y="0"/>
+            <a:ext cx="8126730" cy="5105400"/>
+          </a:xfrm>
+          <a:prstGeom prst="rect">
+            <a:avLst/>
+          </a:prstGeom>
+          <a:ln>
+            <a:noFill/>
+          </a:ln>
+        </p:spPr>
+        <p:style>
+          <a:lnRef idx="2">
+            <a:schemeClr val="accent1">
+              <a:shade val="50000"/>
+            </a:schemeClr>
+          </a:lnRef>
+          <a:fillRef idx="1">
+            <a:schemeClr val="accent1"/>
+          </a:fillRef>
+          <a:effectRef idx="0">
+            <a:schemeClr val="accent1"/>
+          </a:effectRef>
+          <a:fontRef idx="minor">
+            <a:schemeClr val="lt1"/>
+          </a:fontRef>
+        </p:style>
+      </p:sp>
+      <p:sp>
+        <p:nvSpPr>
+          <p:cNvPr id="14" name="Rectangle 13">
+            <a:extLst>
+              <a:ext uri="{FF2B5EF4-FFF2-40B4-BE49-F238E27FC236}">
+                <a16:creationId xmlns:a16="http://schemas.microsoft.com/office/drawing/2014/main" id="{64BC717F-58B3-4A4E-BC3B-1B11323AD5C9}"/>
+              </a:ext>
+              <a:ext uri="{C183D7F6-B498-43B3-948B-1728B52AA6E4}">
+                <adec:decorative xmlns:adec="http://schemas.microsoft.com/office/drawing/2017/decorative" val="1"/>
+              </a:ext>
+            </a:extLst>
+          </p:cNvPr>
+          <p:cNvSpPr>
+            <a:spLocks noGrp="1" noRot="1" noChangeAspect="1" noMove="1" noResize="1" noEditPoints="1" noAdjustHandles="1" noChangeArrowheads="1" noChangeShapeType="1" noTextEdit="1"/>
+          </p:cNvSpPr>
+          <p:nvPr>
+            <p:extLst>
+              <p:ext uri="{386F3935-93C4-4BCD-93E2-E3B085C9AB24}">
+                <p16:designElem xmlns:p16="http://schemas.microsoft.com/office/powerpoint/2015/main" val="1"/>
+              </p:ext>
+            </p:extLst>
+          </p:nvPr>
+        </p:nvSpPr>
+        <p:spPr>
+          <a:xfrm>
+            <a:off x="342900" y="5105400"/>
+            <a:ext cx="8126730" cy="1752600"/>
+          </a:xfrm>
+          <a:prstGeom prst="rect">
+            <a:avLst/>
+          </a:prstGeom>
+          <a:solidFill>
+            <a:srgbClr val="353537"/>
+          </a:solidFill>
+          <a:ln>
+            <a:noFill/>
+          </a:ln>
+        </p:spPr>
+        <p:style>
+          <a:lnRef idx="2">
+            <a:schemeClr val="accent1">
+              <a:shade val="50000"/>
+            </a:schemeClr>
+          </a:lnRef>
+          <a:fillRef idx="1">
+            <a:schemeClr val="accent1"/>
+          </a:fillRef>
+          <a:effectRef idx="0">
+            <a:schemeClr val="accent1"/>
+          </a:effectRef>
+          <a:fontRef idx="minor">
+            <a:schemeClr val="lt1"/>
+          </a:fontRef>
+        </p:style>
+      </p:sp>
+      <p:sp>
+        <p:nvSpPr>
+          <p:cNvPr id="2" name="Titel 1"/>
+          <p:cNvSpPr>
+            <a:spLocks noGrp="1"/>
+          </p:cNvSpPr>
+          <p:nvPr>
+            <p:ph type="title" idx="4294967295"/>
+          </p:nvPr>
+        </p:nvSpPr>
+        <p:spPr>
+          <a:xfrm>
+            <a:off x="708137" y="5181600"/>
+            <a:ext cx="7617326" cy="1076324"/>
+          </a:xfrm>
+        </p:spPr>
+        <p:txBody>
+          <a:bodyPr vert="horz" lIns="91440" tIns="45720" rIns="91440" bIns="45720" rtlCol="0" anchor="b">
+            <a:normAutofit/>
+          </a:bodyPr>
+          <a:lstStyle/>
+          <a:p>
+            <a:pPr>
+              <a:lnSpc>
+                <a:spcPct val="85000"/>
+              </a:lnSpc>
+            </a:pPr>
+            <a:r>
+              <a:rPr lang="en-US" sz="4700" dirty="0" err="1">
+                <a:solidFill>
+                  <a:srgbClr val="FFFFFF"/>
+                </a:solidFill>
+              </a:rPr>
+              <a:t>Mögliche</a:t>
+            </a:r>
+            <a:r>
+              <a:rPr lang="en-US" sz="4700" dirty="0">
+                <a:solidFill>
+                  <a:srgbClr val="FFFFFF"/>
+                </a:solidFill>
+              </a:rPr>
+              <a:t> </a:t>
+            </a:r>
+            <a:r>
+              <a:rPr lang="en-US" sz="4700" dirty="0" err="1">
+                <a:solidFill>
+                  <a:srgbClr val="FFFFFF"/>
+                </a:solidFill>
+              </a:rPr>
+              <a:t>Angriffe</a:t>
+            </a:r>
+            <a:endParaRPr lang="en-US" sz="4700" dirty="0">
+              <a:solidFill>
+                <a:srgbClr val="FFFFFF"/>
+              </a:solidFill>
+            </a:endParaRPr>
+          </a:p>
+        </p:txBody>
+      </p:sp>
+      <p:sp>
+        <p:nvSpPr>
+          <p:cNvPr id="16" name="Rectangle 15">
+            <a:extLst>
+              <a:ext uri="{FF2B5EF4-FFF2-40B4-BE49-F238E27FC236}">
+                <a16:creationId xmlns:a16="http://schemas.microsoft.com/office/drawing/2014/main" id="{1EE75710-64C5-4CA8-8A7C-82EE4125C90D}"/>
+              </a:ext>
+              <a:ext uri="{C183D7F6-B498-43B3-948B-1728B52AA6E4}">
+                <adec:decorative xmlns:adec="http://schemas.microsoft.com/office/drawing/2017/decorative" val="1"/>
+              </a:ext>
+            </a:extLst>
+          </p:cNvPr>
+          <p:cNvSpPr>
+            <a:spLocks noGrp="1" noRot="1" noChangeAspect="1" noMove="1" noResize="1" noEditPoints="1" noAdjustHandles="1" noChangeArrowheads="1" noChangeShapeType="1" noTextEdit="1"/>
+          </p:cNvSpPr>
+          <p:nvPr>
+            <p:extLst>
+              <p:ext uri="{386F3935-93C4-4BCD-93E2-E3B085C9AB24}">
+                <p16:designElem xmlns:p16="http://schemas.microsoft.com/office/powerpoint/2015/main" val="1"/>
+              </p:ext>
+            </p:extLst>
+          </p:nvPr>
+        </p:nvSpPr>
+        <p:spPr>
+          <a:xfrm>
+            <a:off x="0" y="0"/>
+            <a:ext cx="342900" cy="6858000"/>
+          </a:xfrm>
+          <a:prstGeom prst="rect">
+            <a:avLst/>
+          </a:prstGeom>
+          <a:solidFill>
+            <a:srgbClr val="6F6F74"/>
+          </a:solidFill>
+          <a:ln>
+            <a:noFill/>
+          </a:ln>
+        </p:spPr>
+        <p:style>
+          <a:lnRef idx="2">
+            <a:schemeClr val="accent1">
+              <a:shade val="50000"/>
+            </a:schemeClr>
+          </a:lnRef>
+          <a:fillRef idx="1">
+            <a:schemeClr val="accent1"/>
+          </a:fillRef>
+          <a:effectRef idx="0">
+            <a:schemeClr val="accent1"/>
+          </a:effectRef>
+          <a:fontRef idx="minor">
+            <a:schemeClr val="lt1"/>
+          </a:fontRef>
+        </p:style>
+        <p:txBody>
+          <a:bodyPr rtlCol="0" anchor="ctr"/>
+          <a:lstStyle/>
+          <a:p>
+            <a:pPr algn="ctr"/>
+            <a:endParaRPr lang="en-US"/>
+          </a:p>
+        </p:txBody>
+      </p:sp>
+      <p:sp>
+        <p:nvSpPr>
+          <p:cNvPr id="18" name="Rectangle 17">
+            <a:extLst>
+              <a:ext uri="{FF2B5EF4-FFF2-40B4-BE49-F238E27FC236}">
+                <a16:creationId xmlns:a16="http://schemas.microsoft.com/office/drawing/2014/main" id="{435050B1-74E1-4A81-923D-0F5971A3BC01}"/>
+              </a:ext>
+              <a:ext uri="{C183D7F6-B498-43B3-948B-1728B52AA6E4}">
+                <adec:decorative xmlns:adec="http://schemas.microsoft.com/office/drawing/2017/decorative" val="1"/>
+              </a:ext>
+            </a:extLst>
+          </p:cNvPr>
+          <p:cNvSpPr>
+            <a:spLocks noGrp="1" noRot="1" noChangeAspect="1" noMove="1" noResize="1" noEditPoints="1" noAdjustHandles="1" noChangeArrowheads="1" noChangeShapeType="1" noTextEdit="1"/>
+          </p:cNvSpPr>
+          <p:nvPr>
+            <p:extLst>
+              <p:ext uri="{386F3935-93C4-4BCD-93E2-E3B085C9AB24}">
+                <p16:designElem xmlns:p16="http://schemas.microsoft.com/office/powerpoint/2015/main" val="1"/>
+              </p:ext>
+            </p:extLst>
+          </p:nvPr>
+        </p:nvSpPr>
+        <p:spPr>
+          <a:xfrm>
+            <a:off x="8469630" y="0"/>
+            <a:ext cx="674370" cy="6858000"/>
+          </a:xfrm>
+          <a:prstGeom prst="rect">
+            <a:avLst/>
+          </a:prstGeom>
+          <a:solidFill>
+            <a:srgbClr val="353537"/>
+          </a:solidFill>
+          <a:ln>
+            <a:noFill/>
+          </a:ln>
+        </p:spPr>
+        <p:style>
+          <a:lnRef idx="2">
+            <a:schemeClr val="accent1">
+              <a:shade val="50000"/>
+            </a:schemeClr>
+          </a:lnRef>
+          <a:fillRef idx="1">
+            <a:schemeClr val="accent1"/>
+          </a:fillRef>
+          <a:effectRef idx="0">
+            <a:schemeClr val="accent1"/>
+          </a:effectRef>
+          <a:fontRef idx="minor">
+            <a:schemeClr val="lt1"/>
+          </a:fontRef>
+        </p:style>
+        <p:txBody>
+          <a:bodyPr rtlCol="0" anchor="ctr"/>
+          <a:lstStyle/>
+          <a:p>
+            <a:pPr algn="ctr"/>
+            <a:endParaRPr lang="en-US"/>
+          </a:p>
+        </p:txBody>
+      </p:sp>
+      <p:pic>
+        <p:nvPicPr>
+          <p:cNvPr id="3" name="Grafik 2" descr="Ein Bild, das Text enthält.&#10;&#10;Automatisch generierte Beschreibung">
+            <a:extLst>
+              <a:ext uri="{FF2B5EF4-FFF2-40B4-BE49-F238E27FC236}">
+                <a16:creationId xmlns:a16="http://schemas.microsoft.com/office/drawing/2014/main" id="{2A83E46B-571B-EC47-A056-1401C3A9174C}"/>
+              </a:ext>
+            </a:extLst>
+          </p:cNvPr>
+          <p:cNvPicPr>
+            <a:picLocks noChangeAspect="1"/>
+          </p:cNvPicPr>
+          <p:nvPr/>
+        </p:nvPicPr>
+        <p:blipFill>
+          <a:blip r:embed="rId2">
+            <a:extLst>
+              <a:ext uri="{28A0092B-C50C-407E-A947-70E740481C1C}">
+                <a14:useLocalDpi xmlns:a14="http://schemas.microsoft.com/office/drawing/2010/main" val="0"/>
+              </a:ext>
+            </a:extLst>
+          </a:blip>
+          <a:stretch>
+            <a:fillRect/>
+          </a:stretch>
+        </p:blipFill>
+        <p:spPr>
+          <a:xfrm>
+            <a:off x="1365037" y="836712"/>
+            <a:ext cx="6413926" cy="1267992"/>
+          </a:xfrm>
+          <a:prstGeom prst="rect">
+            <a:avLst/>
+          </a:prstGeom>
+        </p:spPr>
+      </p:pic>
+      <p:grpSp>
+        <p:nvGrpSpPr>
+          <p:cNvPr id="6" name="Gruppieren 5">
+            <a:extLst>
+              <a:ext uri="{FF2B5EF4-FFF2-40B4-BE49-F238E27FC236}">
+                <a16:creationId xmlns:a16="http://schemas.microsoft.com/office/drawing/2014/main" id="{55F11E14-3017-BE01-3A67-ED9CDF233E4E}"/>
+              </a:ext>
+            </a:extLst>
+          </p:cNvPr>
+          <p:cNvGrpSpPr/>
+          <p:nvPr/>
+        </p:nvGrpSpPr>
+        <p:grpSpPr>
+          <a:xfrm>
+            <a:off x="1187624" y="2420888"/>
+            <a:ext cx="6768752" cy="1206074"/>
+            <a:chOff x="1187624" y="2060848"/>
+            <a:chExt cx="6768752" cy="1206074"/>
+          </a:xfrm>
+        </p:grpSpPr>
+        <p:pic>
+          <p:nvPicPr>
+            <p:cNvPr id="4" name="Grafik 3" descr="Ein Bild, das Text, Tisch enthält.&#10;&#10;Automatisch generierte Beschreibung">
+              <a:extLst>
+                <a:ext uri="{FF2B5EF4-FFF2-40B4-BE49-F238E27FC236}">
+                  <a16:creationId xmlns:a16="http://schemas.microsoft.com/office/drawing/2014/main" id="{C7F44612-4427-2B7A-55EA-2A5139A71A93}"/>
+                </a:ext>
+              </a:extLst>
+            </p:cNvPr>
+            <p:cNvPicPr>
+              <a:picLocks noChangeAspect="1"/>
+            </p:cNvPicPr>
+            <p:nvPr/>
+          </p:nvPicPr>
+          <p:blipFill rotWithShape="1">
+            <a:blip r:embed="rId3">
+              <a:extLst>
+                <a:ext uri="{28A0092B-C50C-407E-A947-70E740481C1C}">
+                  <a14:useLocalDpi xmlns:a14="http://schemas.microsoft.com/office/drawing/2010/main" val="0"/>
+                </a:ext>
+              </a:extLst>
+            </a:blip>
+            <a:srcRect/>
+            <a:stretch/>
+          </p:blipFill>
+          <p:spPr>
+            <a:xfrm>
+              <a:off x="1363763" y="2199878"/>
+              <a:ext cx="6415200" cy="1067044"/>
+            </a:xfrm>
+            <a:prstGeom prst="rect">
+              <a:avLst/>
+            </a:prstGeom>
+          </p:spPr>
+        </p:pic>
+        <p:sp>
+          <p:nvSpPr>
+            <p:cNvPr id="5" name="Rechteck 4">
+              <a:extLst>
+                <a:ext uri="{FF2B5EF4-FFF2-40B4-BE49-F238E27FC236}">
+                  <a16:creationId xmlns:a16="http://schemas.microsoft.com/office/drawing/2014/main" id="{488500BB-F099-C179-A8F3-A3876DE32E9C}"/>
+                </a:ext>
+              </a:extLst>
+            </p:cNvPr>
+            <p:cNvSpPr/>
+            <p:nvPr/>
+          </p:nvSpPr>
+          <p:spPr>
+            <a:xfrm>
+              <a:off x="1187624" y="2060848"/>
+              <a:ext cx="6768752" cy="162079"/>
+            </a:xfrm>
+            <a:prstGeom prst="rect">
+              <a:avLst/>
+            </a:prstGeom>
+            <a:solidFill>
+              <a:schemeClr val="bg1"/>
+            </a:solidFill>
+            <a:ln>
+              <a:noFill/>
+            </a:ln>
+          </p:spPr>
+          <p:style>
+            <a:lnRef idx="2">
+              <a:schemeClr val="accent1">
+                <a:shade val="50000"/>
+              </a:schemeClr>
+            </a:lnRef>
+            <a:fillRef idx="1">
+              <a:schemeClr val="accent1"/>
+            </a:fillRef>
+            <a:effectRef idx="0">
+              <a:schemeClr val="accent1"/>
+            </a:effectRef>
+            <a:fontRef idx="minor">
+              <a:schemeClr val="lt1"/>
+            </a:fontRef>
+          </p:style>
+          <p:txBody>
+            <a:bodyPr rtlCol="0" anchor="ctr"/>
+            <a:lstStyle/>
+            <a:p>
+              <a:pPr algn="ctr"/>
+              <a:endParaRPr lang="de-DE"/>
+            </a:p>
+          </p:txBody>
+        </p:sp>
+      </p:grpSp>
+    </p:spTree>
+    <p:extLst>
+      <p:ext uri="{BB962C8B-B14F-4D97-AF65-F5344CB8AC3E}">
+        <p14:creationId xmlns:p14="http://schemas.microsoft.com/office/powerpoint/2010/main" val="685691974"/>
+      </p:ext>
+    </p:extLst>
+  </p:cSld>
+  <p:clrMapOvr>
+    <a:masterClrMapping/>
+  </p:clrMapOvr>
+</p:sld>
+</file>
+
+<file path=ppt/slides/slide13.xml><?xml version="1.0" encoding="utf-8"?>
+<p:sld xmlns:a="http://schemas.openxmlformats.org/drawingml/2006/main" xmlns:r="http://schemas.openxmlformats.org/officeDocument/2006/relationships" xmlns:p="http://schemas.openxmlformats.org/presentationml/2006/main">
+  <p:cSld>
+    <p:spTree>
+      <p:nvGrpSpPr>
+        <p:cNvPr id="1" name=""/>
+        <p:cNvGrpSpPr/>
+        <p:nvPr/>
+      </p:nvGrpSpPr>
+      <p:grpSpPr>
+        <a:xfrm>
+          <a:off x="0" y="0"/>
+          <a:ext cx="0" cy="0"/>
+          <a:chOff x="0" y="0"/>
+          <a:chExt cx="0" cy="0"/>
+        </a:xfrm>
+      </p:grpSpPr>
+      <p:sp>
+        <p:nvSpPr>
+          <p:cNvPr id="10" name="Titel 9">
+            <a:extLst>
+              <a:ext uri="{FF2B5EF4-FFF2-40B4-BE49-F238E27FC236}">
+                <a16:creationId xmlns:a16="http://schemas.microsoft.com/office/drawing/2014/main" id="{5204C058-6877-EE19-CF8C-563327D85CB5}"/>
+              </a:ext>
+            </a:extLst>
+          </p:cNvPr>
+          <p:cNvSpPr>
+            <a:spLocks noGrp="1"/>
+          </p:cNvSpPr>
+          <p:nvPr>
+            <p:ph type="title"/>
+          </p:nvPr>
+        </p:nvSpPr>
+        <p:spPr>
+          <a:xfrm>
+            <a:off x="534829" y="540416"/>
+            <a:ext cx="7269480" cy="689684"/>
+          </a:xfrm>
+        </p:spPr>
+        <p:txBody>
+          <a:bodyPr/>
+          <a:lstStyle/>
+          <a:p>
+            <a:r>
+              <a:rPr lang="de-DE" dirty="0"/>
+              <a:t>CWSS-Score</a:t>
+            </a:r>
+          </a:p>
+        </p:txBody>
+      </p:sp>
+      <p:sp>
+        <p:nvSpPr>
+          <p:cNvPr id="3" name="Inhaltsplatzhalter 2">
+            <a:extLst>
+              <a:ext uri="{FF2B5EF4-FFF2-40B4-BE49-F238E27FC236}">
+                <a16:creationId xmlns:a16="http://schemas.microsoft.com/office/drawing/2014/main" id="{A04F9E0B-372B-3544-E4AD-41E9392620F4}"/>
+              </a:ext>
+            </a:extLst>
+          </p:cNvPr>
+          <p:cNvSpPr>
+            <a:spLocks noGrp="1"/>
+          </p:cNvSpPr>
+          <p:nvPr>
+            <p:ph idx="1"/>
+          </p:nvPr>
+        </p:nvSpPr>
+        <p:spPr/>
+        <p:txBody>
+          <a:bodyPr/>
+          <a:lstStyle/>
+          <a:p>
+            <a:endParaRPr lang="de-DE"/>
+          </a:p>
+        </p:txBody>
+      </p:sp>
+      <p:pic>
+        <p:nvPicPr>
+          <p:cNvPr id="4" name="Grafik 3">
+            <a:extLst>
+              <a:ext uri="{FF2B5EF4-FFF2-40B4-BE49-F238E27FC236}">
+                <a16:creationId xmlns:a16="http://schemas.microsoft.com/office/drawing/2014/main" id="{CFE348AD-8A75-96E7-76F7-2B4C15264FA5}"/>
+              </a:ext>
+            </a:extLst>
+          </p:cNvPr>
+          <p:cNvPicPr>
+            <a:picLocks noChangeAspect="1"/>
+          </p:cNvPicPr>
+          <p:nvPr/>
+        </p:nvPicPr>
+        <p:blipFill>
+          <a:blip r:embed="rId2" cstate="print">
+            <a:extLst>
+              <a:ext uri="{28A0092B-C50C-407E-A947-70E740481C1C}">
+                <a14:useLocalDpi xmlns:a14="http://schemas.microsoft.com/office/drawing/2010/main" val="0"/>
+              </a:ext>
+            </a:extLst>
+          </a:blip>
+          <a:srcRect/>
+          <a:stretch>
+            <a:fillRect/>
+          </a:stretch>
+        </p:blipFill>
+        <p:spPr bwMode="auto">
+          <a:xfrm>
+            <a:off x="1134850" y="2204864"/>
+            <a:ext cx="6069437" cy="2448272"/>
+          </a:xfrm>
+          <a:prstGeom prst="rect">
+            <a:avLst/>
+          </a:prstGeom>
+          <a:noFill/>
+          <a:ln>
+            <a:noFill/>
+          </a:ln>
+        </p:spPr>
+      </p:pic>
+    </p:spTree>
+    <p:extLst>
+      <p:ext uri="{BB962C8B-B14F-4D97-AF65-F5344CB8AC3E}">
+        <p14:creationId xmlns:p14="http://schemas.microsoft.com/office/powerpoint/2010/main" val="101631287"/>
+      </p:ext>
+    </p:extLst>
+  </p:cSld>
+  <p:clrMapOvr>
+    <a:masterClrMapping/>
+  </p:clrMapOvr>
+</p:sld>
+</file>
+
+<file path=ppt/slides/slide14.xml><?xml version="1.0" encoding="utf-8"?>
+<p:sld xmlns:a="http://schemas.openxmlformats.org/drawingml/2006/main" xmlns:r="http://schemas.openxmlformats.org/officeDocument/2006/relationships" xmlns:p="http://schemas.openxmlformats.org/presentationml/2006/main">
+  <p:cSld>
+    <p:spTree>
+      <p:nvGrpSpPr>
+        <p:cNvPr id="1" name=""/>
+        <p:cNvGrpSpPr/>
+        <p:nvPr/>
+      </p:nvGrpSpPr>
+      <p:grpSpPr>
+        <a:xfrm>
+          <a:off x="0" y="0"/>
+          <a:ext cx="0" cy="0"/>
+          <a:chOff x="0" y="0"/>
+          <a:chExt cx="0" cy="0"/>
+        </a:xfrm>
+      </p:grpSpPr>
+      <p:sp>
+        <p:nvSpPr>
+          <p:cNvPr id="2" name="Titel 1">
+            <a:extLst>
+              <a:ext uri="{FF2B5EF4-FFF2-40B4-BE49-F238E27FC236}">
+                <a16:creationId xmlns:a16="http://schemas.microsoft.com/office/drawing/2014/main" id="{A3CD048E-CEDA-35FC-F047-83AD01B17A3A}"/>
+              </a:ext>
+            </a:extLst>
+          </p:cNvPr>
+          <p:cNvSpPr>
+            <a:spLocks noGrp="1"/>
+          </p:cNvSpPr>
+          <p:nvPr>
+            <p:ph type="title"/>
+          </p:nvPr>
+        </p:nvSpPr>
+        <p:spPr>
+          <a:xfrm>
+            <a:off x="395536" y="476672"/>
+            <a:ext cx="7269480" cy="782602"/>
+          </a:xfrm>
+        </p:spPr>
+        <p:txBody>
+          <a:bodyPr/>
+          <a:lstStyle/>
+          <a:p>
+            <a:r>
+              <a:rPr lang="de-DE" dirty="0"/>
+              <a:t>Beheben der Schwachstellen</a:t>
+            </a:r>
+          </a:p>
+        </p:txBody>
+      </p:sp>
+      <p:grpSp>
+        <p:nvGrpSpPr>
+          <p:cNvPr id="28" name="Gruppieren 27">
+            <a:extLst>
+              <a:ext uri="{FF2B5EF4-FFF2-40B4-BE49-F238E27FC236}">
+                <a16:creationId xmlns:a16="http://schemas.microsoft.com/office/drawing/2014/main" id="{159F2885-BA85-1B54-96F0-901B0910AB0E}"/>
+              </a:ext>
+            </a:extLst>
+          </p:cNvPr>
+          <p:cNvGrpSpPr/>
+          <p:nvPr/>
+        </p:nvGrpSpPr>
+        <p:grpSpPr>
+          <a:xfrm>
+            <a:off x="680049" y="1643991"/>
+            <a:ext cx="6700454" cy="4809345"/>
+            <a:chOff x="323528" y="1320590"/>
+            <a:chExt cx="6700454" cy="4809345"/>
+          </a:xfrm>
+        </p:grpSpPr>
+        <p:sp>
+          <p:nvSpPr>
+            <p:cNvPr id="9" name="Freihandform: Form 8">
+              <a:extLst>
+                <a:ext uri="{FF2B5EF4-FFF2-40B4-BE49-F238E27FC236}">
+                  <a16:creationId xmlns:a16="http://schemas.microsoft.com/office/drawing/2014/main" id="{643141F3-1B46-F791-C6F1-94F698F66FBB}"/>
+                </a:ext>
+              </a:extLst>
+            </p:cNvPr>
+            <p:cNvSpPr/>
+            <p:nvPr/>
+          </p:nvSpPr>
+          <p:spPr>
+            <a:xfrm>
+              <a:off x="2312393" y="1320590"/>
+              <a:ext cx="2796839" cy="1008112"/>
+            </a:xfrm>
+            <a:custGeom>
+              <a:avLst/>
+              <a:gdLst>
+                <a:gd name="connsiteX0" fmla="*/ 0 w 2289856"/>
+                <a:gd name="connsiteY0" fmla="*/ 132556 h 1325562"/>
+                <a:gd name="connsiteX1" fmla="*/ 132556 w 2289856"/>
+                <a:gd name="connsiteY1" fmla="*/ 0 h 1325562"/>
+                <a:gd name="connsiteX2" fmla="*/ 2157300 w 2289856"/>
+                <a:gd name="connsiteY2" fmla="*/ 0 h 1325562"/>
+                <a:gd name="connsiteX3" fmla="*/ 2289856 w 2289856"/>
+                <a:gd name="connsiteY3" fmla="*/ 132556 h 1325562"/>
+                <a:gd name="connsiteX4" fmla="*/ 2289856 w 2289856"/>
+                <a:gd name="connsiteY4" fmla="*/ 1193006 h 1325562"/>
+                <a:gd name="connsiteX5" fmla="*/ 2157300 w 2289856"/>
+                <a:gd name="connsiteY5" fmla="*/ 1325562 h 1325562"/>
+                <a:gd name="connsiteX6" fmla="*/ 132556 w 2289856"/>
+                <a:gd name="connsiteY6" fmla="*/ 1325562 h 1325562"/>
+                <a:gd name="connsiteX7" fmla="*/ 0 w 2289856"/>
+                <a:gd name="connsiteY7" fmla="*/ 1193006 h 1325562"/>
+                <a:gd name="connsiteX8" fmla="*/ 0 w 2289856"/>
+                <a:gd name="connsiteY8" fmla="*/ 132556 h 1325562"/>
+              </a:gdLst>
+              <a:ahLst/>
+              <a:cxnLst>
+                <a:cxn ang="0">
+                  <a:pos x="connsiteX0" y="connsiteY0"/>
+                </a:cxn>
+                <a:cxn ang="0">
+                  <a:pos x="connsiteX1" y="connsiteY1"/>
+                </a:cxn>
+                <a:cxn ang="0">
+                  <a:pos x="connsiteX2" y="connsiteY2"/>
+                </a:cxn>
+                <a:cxn ang="0">
+                  <a:pos x="connsiteX3" y="connsiteY3"/>
+                </a:cxn>
+                <a:cxn ang="0">
+                  <a:pos x="connsiteX4" y="connsiteY4"/>
+                </a:cxn>
+                <a:cxn ang="0">
+                  <a:pos x="connsiteX5" y="connsiteY5"/>
+                </a:cxn>
+                <a:cxn ang="0">
+                  <a:pos x="connsiteX6" y="connsiteY6"/>
+                </a:cxn>
+                <a:cxn ang="0">
+                  <a:pos x="connsiteX7" y="connsiteY7"/>
+                </a:cxn>
+                <a:cxn ang="0">
+                  <a:pos x="connsiteX8" y="connsiteY8"/>
+                </a:cxn>
+              </a:cxnLst>
+              <a:rect l="l" t="t" r="r" b="b"/>
+              <a:pathLst>
+                <a:path w="2289856" h="1325562">
+                  <a:moveTo>
+                    <a:pt x="0" y="132556"/>
+                  </a:moveTo>
+                  <a:cubicBezTo>
+                    <a:pt x="0" y="59347"/>
+                    <a:pt x="59347" y="0"/>
+                    <a:pt x="132556" y="0"/>
+                  </a:cubicBezTo>
+                  <a:lnTo>
+                    <a:pt x="2157300" y="0"/>
+                  </a:lnTo>
+                  <a:cubicBezTo>
+                    <a:pt x="2230509" y="0"/>
+                    <a:pt x="2289856" y="59347"/>
+                    <a:pt x="2289856" y="132556"/>
+                  </a:cubicBezTo>
+                  <a:lnTo>
+                    <a:pt x="2289856" y="1193006"/>
+                  </a:lnTo>
+                  <a:cubicBezTo>
+                    <a:pt x="2289856" y="1266215"/>
+                    <a:pt x="2230509" y="1325562"/>
+                    <a:pt x="2157300" y="1325562"/>
+                  </a:cubicBezTo>
+                  <a:lnTo>
+                    <a:pt x="132556" y="1325562"/>
+                  </a:lnTo>
+                  <a:cubicBezTo>
+                    <a:pt x="59347" y="1325562"/>
+                    <a:pt x="0" y="1266215"/>
+                    <a:pt x="0" y="1193006"/>
+                  </a:cubicBezTo>
+                  <a:lnTo>
+                    <a:pt x="0" y="132556"/>
+                  </a:lnTo>
+                  <a:close/>
+                </a:path>
+              </a:pathLst>
+            </a:custGeom>
+            <a:solidFill>
+              <a:srgbClr val="C00000"/>
+            </a:solidFill>
+          </p:spPr>
+          <p:style>
+            <a:lnRef idx="2">
+              <a:schemeClr val="lt1">
+                <a:hueOff val="0"/>
+                <a:satOff val="0"/>
+                <a:lumOff val="0"/>
+                <a:alphaOff val="0"/>
+              </a:schemeClr>
+            </a:lnRef>
+            <a:fillRef idx="1">
+              <a:scrgbClr r="0" g="0" b="0"/>
+            </a:fillRef>
+            <a:effectRef idx="0">
+              <a:schemeClr val="accent1">
+                <a:hueOff val="0"/>
+                <a:satOff val="0"/>
+                <a:lumOff val="0"/>
+                <a:alphaOff val="0"/>
+              </a:schemeClr>
+            </a:effectRef>
+            <a:fontRef idx="minor">
+              <a:schemeClr val="lt1"/>
+            </a:fontRef>
+          </p:style>
+          <p:txBody>
+            <a:bodyPr spcFirstLastPara="0" vert="horz" wrap="square" lIns="126454" tIns="126454" rIns="126454" bIns="126454" numCol="1" spcCol="1270" anchor="ctr" anchorCtr="0">
+              <a:noAutofit/>
+            </a:bodyPr>
+            <a:lstStyle/>
+            <a:p>
+              <a:pPr marL="0" lvl="0" indent="0" algn="ctr" defTabSz="1022350">
+                <a:lnSpc>
+                  <a:spcPct val="90000"/>
+                </a:lnSpc>
+                <a:spcBef>
+                  <a:spcPct val="0"/>
+                </a:spcBef>
+                <a:spcAft>
+                  <a:spcPct val="35000"/>
+                </a:spcAft>
+                <a:buNone/>
+              </a:pPr>
+              <a:r>
+                <a:rPr lang="de-DE" sz="2300" kern="1200" dirty="0"/>
+                <a:t>Unverschlüsselte Übertragung</a:t>
+              </a:r>
+            </a:p>
+          </p:txBody>
+        </p:sp>
+        <p:sp>
+          <p:nvSpPr>
+            <p:cNvPr id="11" name="Freihandform: Form 10">
+              <a:extLst>
+                <a:ext uri="{FF2B5EF4-FFF2-40B4-BE49-F238E27FC236}">
+                  <a16:creationId xmlns:a16="http://schemas.microsoft.com/office/drawing/2014/main" id="{AA1DDE76-8DE8-F203-1E43-E7C8DB62AD5D}"/>
+                </a:ext>
+              </a:extLst>
+            </p:cNvPr>
+            <p:cNvSpPr/>
+            <p:nvPr/>
+          </p:nvSpPr>
+          <p:spPr>
+            <a:xfrm>
+              <a:off x="2312032" y="2942931"/>
+              <a:ext cx="2797200" cy="1008000"/>
+            </a:xfrm>
+            <a:custGeom>
+              <a:avLst/>
+              <a:gdLst>
+                <a:gd name="connsiteX0" fmla="*/ 0 w 2289856"/>
+                <a:gd name="connsiteY0" fmla="*/ 132556 h 1325562"/>
+                <a:gd name="connsiteX1" fmla="*/ 132556 w 2289856"/>
+                <a:gd name="connsiteY1" fmla="*/ 0 h 1325562"/>
+                <a:gd name="connsiteX2" fmla="*/ 2157300 w 2289856"/>
+                <a:gd name="connsiteY2" fmla="*/ 0 h 1325562"/>
+                <a:gd name="connsiteX3" fmla="*/ 2289856 w 2289856"/>
+                <a:gd name="connsiteY3" fmla="*/ 132556 h 1325562"/>
+                <a:gd name="connsiteX4" fmla="*/ 2289856 w 2289856"/>
+                <a:gd name="connsiteY4" fmla="*/ 1193006 h 1325562"/>
+                <a:gd name="connsiteX5" fmla="*/ 2157300 w 2289856"/>
+                <a:gd name="connsiteY5" fmla="*/ 1325562 h 1325562"/>
+                <a:gd name="connsiteX6" fmla="*/ 132556 w 2289856"/>
+                <a:gd name="connsiteY6" fmla="*/ 1325562 h 1325562"/>
+                <a:gd name="connsiteX7" fmla="*/ 0 w 2289856"/>
+                <a:gd name="connsiteY7" fmla="*/ 1193006 h 1325562"/>
+                <a:gd name="connsiteX8" fmla="*/ 0 w 2289856"/>
+                <a:gd name="connsiteY8" fmla="*/ 132556 h 1325562"/>
+              </a:gdLst>
+              <a:ahLst/>
+              <a:cxnLst>
+                <a:cxn ang="0">
+                  <a:pos x="connsiteX0" y="connsiteY0"/>
+                </a:cxn>
+                <a:cxn ang="0">
+                  <a:pos x="connsiteX1" y="connsiteY1"/>
+                </a:cxn>
+                <a:cxn ang="0">
+                  <a:pos x="connsiteX2" y="connsiteY2"/>
+                </a:cxn>
+                <a:cxn ang="0">
+                  <a:pos x="connsiteX3" y="connsiteY3"/>
+                </a:cxn>
+                <a:cxn ang="0">
+                  <a:pos x="connsiteX4" y="connsiteY4"/>
+                </a:cxn>
+                <a:cxn ang="0">
+                  <a:pos x="connsiteX5" y="connsiteY5"/>
+                </a:cxn>
+                <a:cxn ang="0">
+                  <a:pos x="connsiteX6" y="connsiteY6"/>
+                </a:cxn>
+                <a:cxn ang="0">
+                  <a:pos x="connsiteX7" y="connsiteY7"/>
+                </a:cxn>
+                <a:cxn ang="0">
+                  <a:pos x="connsiteX8" y="connsiteY8"/>
+                </a:cxn>
+              </a:cxnLst>
+              <a:rect l="l" t="t" r="r" b="b"/>
+              <a:pathLst>
+                <a:path w="2289856" h="1325562">
+                  <a:moveTo>
+                    <a:pt x="0" y="132556"/>
+                  </a:moveTo>
+                  <a:cubicBezTo>
+                    <a:pt x="0" y="59347"/>
+                    <a:pt x="59347" y="0"/>
+                    <a:pt x="132556" y="0"/>
+                  </a:cubicBezTo>
+                  <a:lnTo>
+                    <a:pt x="2157300" y="0"/>
+                  </a:lnTo>
+                  <a:cubicBezTo>
+                    <a:pt x="2230509" y="0"/>
+                    <a:pt x="2289856" y="59347"/>
+                    <a:pt x="2289856" y="132556"/>
+                  </a:cubicBezTo>
+                  <a:lnTo>
+                    <a:pt x="2289856" y="1193006"/>
+                  </a:lnTo>
+                  <a:cubicBezTo>
+                    <a:pt x="2289856" y="1266215"/>
+                    <a:pt x="2230509" y="1325562"/>
+                    <a:pt x="2157300" y="1325562"/>
+                  </a:cubicBezTo>
+                  <a:lnTo>
+                    <a:pt x="132556" y="1325562"/>
+                  </a:lnTo>
+                  <a:cubicBezTo>
+                    <a:pt x="59347" y="1325562"/>
+                    <a:pt x="0" y="1266215"/>
+                    <a:pt x="0" y="1193006"/>
+                  </a:cubicBezTo>
+                  <a:lnTo>
+                    <a:pt x="0" y="132556"/>
+                  </a:lnTo>
+                  <a:close/>
+                </a:path>
+              </a:pathLst>
+            </a:custGeom>
+            <a:solidFill>
+              <a:srgbClr val="00B050"/>
+            </a:solidFill>
+          </p:spPr>
+          <p:style>
+            <a:lnRef idx="2">
+              <a:schemeClr val="lt1">
+                <a:hueOff val="0"/>
+                <a:satOff val="0"/>
+                <a:lumOff val="0"/>
+                <a:alphaOff val="0"/>
+              </a:schemeClr>
+            </a:lnRef>
+            <a:fillRef idx="1">
+              <a:scrgbClr r="0" g="0" b="0"/>
+            </a:fillRef>
+            <a:effectRef idx="0">
+              <a:schemeClr val="accent1">
+                <a:hueOff val="0"/>
+                <a:satOff val="0"/>
+                <a:lumOff val="0"/>
+                <a:alphaOff val="0"/>
+              </a:schemeClr>
+            </a:effectRef>
+            <a:fontRef idx="minor">
+              <a:schemeClr val="lt1"/>
+            </a:fontRef>
+          </p:style>
+          <p:txBody>
+            <a:bodyPr spcFirstLastPara="0" vert="horz" wrap="square" lIns="126454" tIns="126454" rIns="126454" bIns="126454" numCol="1" spcCol="1270" anchor="ctr" anchorCtr="0">
+              <a:noAutofit/>
+            </a:bodyPr>
+            <a:lstStyle/>
+            <a:p>
+              <a:pPr marL="0" lvl="0" indent="0" algn="ctr" defTabSz="1022350">
+                <a:lnSpc>
+                  <a:spcPct val="90000"/>
+                </a:lnSpc>
+                <a:spcBef>
+                  <a:spcPct val="0"/>
+                </a:spcBef>
+                <a:spcAft>
+                  <a:spcPct val="35000"/>
+                </a:spcAft>
+                <a:buNone/>
+              </a:pPr>
+              <a:r>
+                <a:rPr lang="de-DE" sz="2300" kern="1200" dirty="0"/>
+                <a:t>TLS-Verschlüsselung</a:t>
+              </a:r>
+            </a:p>
+          </p:txBody>
+        </p:sp>
+        <p:sp>
+          <p:nvSpPr>
+            <p:cNvPr id="5" name="Freihandform: Form 4">
+              <a:extLst>
+                <a:ext uri="{FF2B5EF4-FFF2-40B4-BE49-F238E27FC236}">
+                  <a16:creationId xmlns:a16="http://schemas.microsoft.com/office/drawing/2014/main" id="{238B79A0-738E-D5A8-35FC-DD0FEB04B84A}"/>
+                </a:ext>
+              </a:extLst>
+            </p:cNvPr>
+            <p:cNvSpPr/>
+            <p:nvPr/>
+          </p:nvSpPr>
+          <p:spPr>
+            <a:xfrm>
+              <a:off x="323528" y="5121935"/>
+              <a:ext cx="2797200" cy="1008000"/>
+            </a:xfrm>
+            <a:custGeom>
+              <a:avLst/>
+              <a:gdLst>
+                <a:gd name="connsiteX0" fmla="*/ 0 w 2289856"/>
+                <a:gd name="connsiteY0" fmla="*/ 132556 h 1325562"/>
+                <a:gd name="connsiteX1" fmla="*/ 132556 w 2289856"/>
+                <a:gd name="connsiteY1" fmla="*/ 0 h 1325562"/>
+                <a:gd name="connsiteX2" fmla="*/ 2157300 w 2289856"/>
+                <a:gd name="connsiteY2" fmla="*/ 0 h 1325562"/>
+                <a:gd name="connsiteX3" fmla="*/ 2289856 w 2289856"/>
+                <a:gd name="connsiteY3" fmla="*/ 132556 h 1325562"/>
+                <a:gd name="connsiteX4" fmla="*/ 2289856 w 2289856"/>
+                <a:gd name="connsiteY4" fmla="*/ 1193006 h 1325562"/>
+                <a:gd name="connsiteX5" fmla="*/ 2157300 w 2289856"/>
+                <a:gd name="connsiteY5" fmla="*/ 1325562 h 1325562"/>
+                <a:gd name="connsiteX6" fmla="*/ 132556 w 2289856"/>
+                <a:gd name="connsiteY6" fmla="*/ 1325562 h 1325562"/>
+                <a:gd name="connsiteX7" fmla="*/ 0 w 2289856"/>
+                <a:gd name="connsiteY7" fmla="*/ 1193006 h 1325562"/>
+                <a:gd name="connsiteX8" fmla="*/ 0 w 2289856"/>
+                <a:gd name="connsiteY8" fmla="*/ 132556 h 1325562"/>
+              </a:gdLst>
+              <a:ahLst/>
+              <a:cxnLst>
+                <a:cxn ang="0">
+                  <a:pos x="connsiteX0" y="connsiteY0"/>
+                </a:cxn>
+                <a:cxn ang="0">
+                  <a:pos x="connsiteX1" y="connsiteY1"/>
+                </a:cxn>
+                <a:cxn ang="0">
+                  <a:pos x="connsiteX2" y="connsiteY2"/>
+                </a:cxn>
+                <a:cxn ang="0">
+                  <a:pos x="connsiteX3" y="connsiteY3"/>
+                </a:cxn>
+                <a:cxn ang="0">
+                  <a:pos x="connsiteX4" y="connsiteY4"/>
+                </a:cxn>
+                <a:cxn ang="0">
+                  <a:pos x="connsiteX5" y="connsiteY5"/>
+                </a:cxn>
+                <a:cxn ang="0">
+                  <a:pos x="connsiteX6" y="connsiteY6"/>
+                </a:cxn>
+                <a:cxn ang="0">
+                  <a:pos x="connsiteX7" y="connsiteY7"/>
+                </a:cxn>
+                <a:cxn ang="0">
+                  <a:pos x="connsiteX8" y="connsiteY8"/>
+                </a:cxn>
+              </a:cxnLst>
+              <a:rect l="l" t="t" r="r" b="b"/>
+              <a:pathLst>
+                <a:path w="2289856" h="1325562">
+                  <a:moveTo>
+                    <a:pt x="0" y="132556"/>
+                  </a:moveTo>
+                  <a:cubicBezTo>
+                    <a:pt x="0" y="59347"/>
+                    <a:pt x="59347" y="0"/>
+                    <a:pt x="132556" y="0"/>
+                  </a:cubicBezTo>
+                  <a:lnTo>
+                    <a:pt x="2157300" y="0"/>
+                  </a:lnTo>
+                  <a:cubicBezTo>
+                    <a:pt x="2230509" y="0"/>
+                    <a:pt x="2289856" y="59347"/>
+                    <a:pt x="2289856" y="132556"/>
+                  </a:cubicBezTo>
+                  <a:lnTo>
+                    <a:pt x="2289856" y="1193006"/>
+                  </a:lnTo>
+                  <a:cubicBezTo>
+                    <a:pt x="2289856" y="1266215"/>
+                    <a:pt x="2230509" y="1325562"/>
+                    <a:pt x="2157300" y="1325562"/>
+                  </a:cubicBezTo>
+                  <a:lnTo>
+                    <a:pt x="132556" y="1325562"/>
+                  </a:lnTo>
+                  <a:cubicBezTo>
+                    <a:pt x="59347" y="1325562"/>
+                    <a:pt x="0" y="1266215"/>
+                    <a:pt x="0" y="1193006"/>
+                  </a:cubicBezTo>
+                  <a:lnTo>
+                    <a:pt x="0" y="132556"/>
+                  </a:lnTo>
+                  <a:close/>
+                </a:path>
+              </a:pathLst>
+            </a:custGeom>
+            <a:solidFill>
+              <a:srgbClr val="00B050"/>
+            </a:solidFill>
+          </p:spPr>
+          <p:style>
+            <a:lnRef idx="2">
+              <a:schemeClr val="lt1">
+                <a:hueOff val="0"/>
+                <a:satOff val="0"/>
+                <a:lumOff val="0"/>
+                <a:alphaOff val="0"/>
+              </a:schemeClr>
+            </a:lnRef>
+            <a:fillRef idx="1">
+              <a:scrgbClr r="0" g="0" b="0"/>
+            </a:fillRef>
+            <a:effectRef idx="0">
+              <a:schemeClr val="accent1">
+                <a:hueOff val="0"/>
+                <a:satOff val="0"/>
+                <a:lumOff val="0"/>
+                <a:alphaOff val="0"/>
+              </a:schemeClr>
+            </a:effectRef>
+            <a:fontRef idx="minor">
+              <a:schemeClr val="lt1"/>
+            </a:fontRef>
+          </p:style>
+          <p:txBody>
+            <a:bodyPr spcFirstLastPara="0" vert="horz" wrap="square" lIns="126454" tIns="126454" rIns="126454" bIns="126454" numCol="1" spcCol="1270" anchor="ctr" anchorCtr="0">
+              <a:noAutofit/>
+            </a:bodyPr>
+            <a:lstStyle/>
+            <a:p>
+              <a:pPr marL="0" lvl="0" indent="0" algn="ctr" defTabSz="1022350">
+                <a:lnSpc>
+                  <a:spcPct val="90000"/>
+                </a:lnSpc>
+                <a:spcBef>
+                  <a:spcPct val="0"/>
+                </a:spcBef>
+                <a:spcAft>
+                  <a:spcPct val="35000"/>
+                </a:spcAft>
+                <a:buNone/>
+              </a:pPr>
+              <a:r>
+                <a:rPr lang="de-DE" sz="2300" dirty="0"/>
+                <a:t>Schutz der Vertraulichkeit</a:t>
+              </a:r>
+              <a:endParaRPr lang="de-DE" sz="2300" kern="1200" dirty="0"/>
+            </a:p>
+          </p:txBody>
+        </p:sp>
+        <p:sp>
+          <p:nvSpPr>
+            <p:cNvPr id="7" name="Freihandform: Form 6">
+              <a:extLst>
+                <a:ext uri="{FF2B5EF4-FFF2-40B4-BE49-F238E27FC236}">
+                  <a16:creationId xmlns:a16="http://schemas.microsoft.com/office/drawing/2014/main" id="{ABC26888-3B4A-81D2-8EC8-9E35E27C24B8}"/>
+                </a:ext>
+              </a:extLst>
+            </p:cNvPr>
+            <p:cNvSpPr/>
+            <p:nvPr/>
+          </p:nvSpPr>
+          <p:spPr>
+            <a:xfrm>
+              <a:off x="4226782" y="5121935"/>
+              <a:ext cx="2797200" cy="1008000"/>
+            </a:xfrm>
+            <a:custGeom>
+              <a:avLst/>
+              <a:gdLst>
+                <a:gd name="connsiteX0" fmla="*/ 0 w 2289856"/>
+                <a:gd name="connsiteY0" fmla="*/ 132556 h 1325562"/>
+                <a:gd name="connsiteX1" fmla="*/ 132556 w 2289856"/>
+                <a:gd name="connsiteY1" fmla="*/ 0 h 1325562"/>
+                <a:gd name="connsiteX2" fmla="*/ 2157300 w 2289856"/>
+                <a:gd name="connsiteY2" fmla="*/ 0 h 1325562"/>
+                <a:gd name="connsiteX3" fmla="*/ 2289856 w 2289856"/>
+                <a:gd name="connsiteY3" fmla="*/ 132556 h 1325562"/>
+                <a:gd name="connsiteX4" fmla="*/ 2289856 w 2289856"/>
+                <a:gd name="connsiteY4" fmla="*/ 1193006 h 1325562"/>
+                <a:gd name="connsiteX5" fmla="*/ 2157300 w 2289856"/>
+                <a:gd name="connsiteY5" fmla="*/ 1325562 h 1325562"/>
+                <a:gd name="connsiteX6" fmla="*/ 132556 w 2289856"/>
+                <a:gd name="connsiteY6" fmla="*/ 1325562 h 1325562"/>
+                <a:gd name="connsiteX7" fmla="*/ 0 w 2289856"/>
+                <a:gd name="connsiteY7" fmla="*/ 1193006 h 1325562"/>
+                <a:gd name="connsiteX8" fmla="*/ 0 w 2289856"/>
+                <a:gd name="connsiteY8" fmla="*/ 132556 h 1325562"/>
+              </a:gdLst>
+              <a:ahLst/>
+              <a:cxnLst>
+                <a:cxn ang="0">
+                  <a:pos x="connsiteX0" y="connsiteY0"/>
+                </a:cxn>
+                <a:cxn ang="0">
+                  <a:pos x="connsiteX1" y="connsiteY1"/>
+                </a:cxn>
+                <a:cxn ang="0">
+                  <a:pos x="connsiteX2" y="connsiteY2"/>
+                </a:cxn>
+                <a:cxn ang="0">
+                  <a:pos x="connsiteX3" y="connsiteY3"/>
+                </a:cxn>
+                <a:cxn ang="0">
+                  <a:pos x="connsiteX4" y="connsiteY4"/>
+                </a:cxn>
+                <a:cxn ang="0">
+                  <a:pos x="connsiteX5" y="connsiteY5"/>
+                </a:cxn>
+                <a:cxn ang="0">
+                  <a:pos x="connsiteX6" y="connsiteY6"/>
+                </a:cxn>
+                <a:cxn ang="0">
+                  <a:pos x="connsiteX7" y="connsiteY7"/>
+                </a:cxn>
+                <a:cxn ang="0">
+                  <a:pos x="connsiteX8" y="connsiteY8"/>
+                </a:cxn>
+              </a:cxnLst>
+              <a:rect l="l" t="t" r="r" b="b"/>
+              <a:pathLst>
+                <a:path w="2289856" h="1325562">
+                  <a:moveTo>
+                    <a:pt x="0" y="132556"/>
+                  </a:moveTo>
+                  <a:cubicBezTo>
+                    <a:pt x="0" y="59347"/>
+                    <a:pt x="59347" y="0"/>
+                    <a:pt x="132556" y="0"/>
+                  </a:cubicBezTo>
+                  <a:lnTo>
+                    <a:pt x="2157300" y="0"/>
+                  </a:lnTo>
+                  <a:cubicBezTo>
+                    <a:pt x="2230509" y="0"/>
+                    <a:pt x="2289856" y="59347"/>
+                    <a:pt x="2289856" y="132556"/>
+                  </a:cubicBezTo>
+                  <a:lnTo>
+                    <a:pt x="2289856" y="1193006"/>
+                  </a:lnTo>
+                  <a:cubicBezTo>
+                    <a:pt x="2289856" y="1266215"/>
+                    <a:pt x="2230509" y="1325562"/>
+                    <a:pt x="2157300" y="1325562"/>
+                  </a:cubicBezTo>
+                  <a:lnTo>
+                    <a:pt x="132556" y="1325562"/>
+                  </a:lnTo>
+                  <a:cubicBezTo>
+                    <a:pt x="59347" y="1325562"/>
+                    <a:pt x="0" y="1266215"/>
+                    <a:pt x="0" y="1193006"/>
+                  </a:cubicBezTo>
+                  <a:lnTo>
+                    <a:pt x="0" y="132556"/>
+                  </a:lnTo>
+                  <a:close/>
+                </a:path>
+              </a:pathLst>
+            </a:custGeom>
+            <a:solidFill>
+              <a:srgbClr val="00B050"/>
+            </a:solidFill>
+          </p:spPr>
+          <p:style>
+            <a:lnRef idx="2">
+              <a:schemeClr val="lt1">
+                <a:hueOff val="0"/>
+                <a:satOff val="0"/>
+                <a:lumOff val="0"/>
+                <a:alphaOff val="0"/>
+              </a:schemeClr>
+            </a:lnRef>
+            <a:fillRef idx="1">
+              <a:scrgbClr r="0" g="0" b="0"/>
+            </a:fillRef>
+            <a:effectRef idx="0">
+              <a:schemeClr val="accent1">
+                <a:hueOff val="0"/>
+                <a:satOff val="0"/>
+                <a:lumOff val="0"/>
+                <a:alphaOff val="0"/>
+              </a:schemeClr>
+            </a:effectRef>
+            <a:fontRef idx="minor">
+              <a:schemeClr val="lt1"/>
+            </a:fontRef>
+          </p:style>
+          <p:txBody>
+            <a:bodyPr spcFirstLastPara="0" vert="horz" wrap="square" lIns="126454" tIns="126454" rIns="126454" bIns="126454" numCol="1" spcCol="1270" anchor="ctr" anchorCtr="0">
+              <a:noAutofit/>
+            </a:bodyPr>
+            <a:lstStyle/>
+            <a:p>
+              <a:pPr marL="0" lvl="0" indent="0" algn="ctr" defTabSz="1022350">
+                <a:lnSpc>
+                  <a:spcPct val="90000"/>
+                </a:lnSpc>
+                <a:spcBef>
+                  <a:spcPct val="0"/>
+                </a:spcBef>
+                <a:spcAft>
+                  <a:spcPct val="35000"/>
+                </a:spcAft>
+                <a:buNone/>
+              </a:pPr>
+              <a:r>
+                <a:rPr lang="de-DE" sz="2300" dirty="0"/>
+                <a:t>Schutz der Integrität</a:t>
+              </a:r>
+              <a:endParaRPr lang="de-DE" sz="2300" kern="1200" dirty="0"/>
+            </a:p>
+          </p:txBody>
+        </p:sp>
+        <p:cxnSp>
+          <p:nvCxnSpPr>
+            <p:cNvPr id="16" name="Gerade Verbindung mit Pfeil 15">
+              <a:extLst>
+                <a:ext uri="{FF2B5EF4-FFF2-40B4-BE49-F238E27FC236}">
+                  <a16:creationId xmlns:a16="http://schemas.microsoft.com/office/drawing/2014/main" id="{765D4CCF-BA74-49D3-81FE-FFEDC60B4E76}"/>
+                </a:ext>
+              </a:extLst>
+            </p:cNvPr>
+            <p:cNvCxnSpPr>
+              <a:cxnSpLocks/>
+            </p:cNvCxnSpPr>
+            <p:nvPr/>
+          </p:nvCxnSpPr>
+          <p:spPr>
+            <a:xfrm>
+              <a:off x="3710632" y="2420888"/>
+              <a:ext cx="0" cy="432048"/>
+            </a:xfrm>
+            <a:prstGeom prst="straightConnector1">
+              <a:avLst/>
+            </a:prstGeom>
+            <a:ln>
+              <a:tailEnd type="triangle"/>
+            </a:ln>
+          </p:spPr>
+          <p:style>
+            <a:lnRef idx="2">
+              <a:schemeClr val="dk1"/>
+            </a:lnRef>
+            <a:fillRef idx="0">
+              <a:schemeClr val="dk1"/>
+            </a:fillRef>
+            <a:effectRef idx="1">
+              <a:schemeClr val="dk1"/>
+            </a:effectRef>
+            <a:fontRef idx="minor">
+              <a:schemeClr val="tx1"/>
+            </a:fontRef>
+          </p:style>
+        </p:cxnSp>
+        <p:cxnSp>
+          <p:nvCxnSpPr>
+            <p:cNvPr id="21" name="Gerader Verbinder 20">
+              <a:extLst>
+                <a:ext uri="{FF2B5EF4-FFF2-40B4-BE49-F238E27FC236}">
+                  <a16:creationId xmlns:a16="http://schemas.microsoft.com/office/drawing/2014/main" id="{422486D5-9C37-2DB7-7D67-E525FB3DC56E}"/>
+                </a:ext>
+              </a:extLst>
+            </p:cNvPr>
+            <p:cNvCxnSpPr/>
+            <p:nvPr/>
+          </p:nvCxnSpPr>
+          <p:spPr>
+            <a:xfrm>
+              <a:off x="3710632" y="4041124"/>
+              <a:ext cx="0" cy="540004"/>
+            </a:xfrm>
+            <a:prstGeom prst="line">
+              <a:avLst/>
+            </a:prstGeom>
+          </p:spPr>
+          <p:style>
+            <a:lnRef idx="2">
+              <a:schemeClr val="dk1"/>
+            </a:lnRef>
+            <a:fillRef idx="0">
+              <a:schemeClr val="dk1"/>
+            </a:fillRef>
+            <a:effectRef idx="1">
+              <a:schemeClr val="dk1"/>
+            </a:effectRef>
+            <a:fontRef idx="minor">
+              <a:schemeClr val="tx1"/>
+            </a:fontRef>
+          </p:style>
+        </p:cxnSp>
+        <p:cxnSp>
+          <p:nvCxnSpPr>
+            <p:cNvPr id="23" name="Gerader Verbinder 22">
+              <a:extLst>
+                <a:ext uri="{FF2B5EF4-FFF2-40B4-BE49-F238E27FC236}">
+                  <a16:creationId xmlns:a16="http://schemas.microsoft.com/office/drawing/2014/main" id="{FB78F7E8-D320-9AE0-D1EB-E5B3C9850A8A}"/>
+                </a:ext>
+              </a:extLst>
+            </p:cNvPr>
+            <p:cNvCxnSpPr>
+              <a:cxnSpLocks/>
+            </p:cNvCxnSpPr>
+            <p:nvPr/>
+          </p:nvCxnSpPr>
+          <p:spPr>
+            <a:xfrm flipH="1">
+              <a:off x="1722128" y="4581128"/>
+              <a:ext cx="1988504" cy="0"/>
+            </a:xfrm>
+            <a:prstGeom prst="line">
+              <a:avLst/>
+            </a:prstGeom>
+          </p:spPr>
+          <p:style>
+            <a:lnRef idx="2">
+              <a:schemeClr val="dk1"/>
+            </a:lnRef>
+            <a:fillRef idx="0">
+              <a:schemeClr val="dk1"/>
+            </a:fillRef>
+            <a:effectRef idx="1">
+              <a:schemeClr val="dk1"/>
+            </a:effectRef>
+            <a:fontRef idx="minor">
+              <a:schemeClr val="tx1"/>
+            </a:fontRef>
+          </p:style>
+        </p:cxnSp>
+        <p:cxnSp>
+          <p:nvCxnSpPr>
+            <p:cNvPr id="25" name="Gerade Verbindung mit Pfeil 24">
+              <a:extLst>
+                <a:ext uri="{FF2B5EF4-FFF2-40B4-BE49-F238E27FC236}">
+                  <a16:creationId xmlns:a16="http://schemas.microsoft.com/office/drawing/2014/main" id="{1855AE4B-5627-1289-BE6D-94338721EE67}"/>
+                </a:ext>
+              </a:extLst>
+            </p:cNvPr>
+            <p:cNvCxnSpPr>
+              <a:cxnSpLocks/>
+            </p:cNvCxnSpPr>
+            <p:nvPr/>
+          </p:nvCxnSpPr>
+          <p:spPr>
+            <a:xfrm>
+              <a:off x="1722128" y="4581128"/>
+              <a:ext cx="0" cy="432048"/>
+            </a:xfrm>
+            <a:prstGeom prst="straightConnector1">
+              <a:avLst/>
+            </a:prstGeom>
+            <a:ln>
+              <a:tailEnd type="triangle"/>
+            </a:ln>
+          </p:spPr>
+          <p:style>
+            <a:lnRef idx="2">
+              <a:schemeClr val="dk1"/>
+            </a:lnRef>
+            <a:fillRef idx="0">
+              <a:schemeClr val="dk1"/>
+            </a:fillRef>
+            <a:effectRef idx="1">
+              <a:schemeClr val="dk1"/>
+            </a:effectRef>
+            <a:fontRef idx="minor">
+              <a:schemeClr val="tx1"/>
+            </a:fontRef>
+          </p:style>
+        </p:cxnSp>
+        <p:cxnSp>
+          <p:nvCxnSpPr>
+            <p:cNvPr id="26" name="Gerader Verbinder 25">
+              <a:extLst>
+                <a:ext uri="{FF2B5EF4-FFF2-40B4-BE49-F238E27FC236}">
+                  <a16:creationId xmlns:a16="http://schemas.microsoft.com/office/drawing/2014/main" id="{871A30B0-6363-B743-CDD3-52B25424C42C}"/>
+                </a:ext>
+              </a:extLst>
+            </p:cNvPr>
+            <p:cNvCxnSpPr>
+              <a:cxnSpLocks/>
+            </p:cNvCxnSpPr>
+            <p:nvPr/>
+          </p:nvCxnSpPr>
+          <p:spPr>
+            <a:xfrm flipH="1">
+              <a:off x="3636878" y="4581128"/>
+              <a:ext cx="1988504" cy="0"/>
+            </a:xfrm>
+            <a:prstGeom prst="line">
+              <a:avLst/>
+            </a:prstGeom>
+          </p:spPr>
+          <p:style>
+            <a:lnRef idx="2">
+              <a:schemeClr val="dk1"/>
+            </a:lnRef>
+            <a:fillRef idx="0">
+              <a:schemeClr val="dk1"/>
+            </a:fillRef>
+            <a:effectRef idx="1">
+              <a:schemeClr val="dk1"/>
+            </a:effectRef>
+            <a:fontRef idx="minor">
+              <a:schemeClr val="tx1"/>
+            </a:fontRef>
+          </p:style>
+        </p:cxnSp>
+        <p:cxnSp>
+          <p:nvCxnSpPr>
+            <p:cNvPr id="27" name="Gerade Verbindung mit Pfeil 26">
+              <a:extLst>
+                <a:ext uri="{FF2B5EF4-FFF2-40B4-BE49-F238E27FC236}">
+                  <a16:creationId xmlns:a16="http://schemas.microsoft.com/office/drawing/2014/main" id="{359484E2-0530-3DAD-A365-6BCC56A355A7}"/>
+                </a:ext>
+              </a:extLst>
+            </p:cNvPr>
+            <p:cNvCxnSpPr>
+              <a:cxnSpLocks/>
+            </p:cNvCxnSpPr>
+            <p:nvPr/>
+          </p:nvCxnSpPr>
+          <p:spPr>
+            <a:xfrm>
+              <a:off x="5625382" y="4581128"/>
+              <a:ext cx="0" cy="432048"/>
+            </a:xfrm>
+            <a:prstGeom prst="straightConnector1">
+              <a:avLst/>
+            </a:prstGeom>
+            <a:ln>
+              <a:tailEnd type="triangle"/>
+            </a:ln>
+          </p:spPr>
+          <p:style>
+            <a:lnRef idx="2">
+              <a:schemeClr val="dk1"/>
+            </a:lnRef>
+            <a:fillRef idx="0">
+              <a:schemeClr val="dk1"/>
+            </a:fillRef>
+            <a:effectRef idx="1">
+              <a:schemeClr val="dk1"/>
+            </a:effectRef>
+            <a:fontRef idx="minor">
+              <a:schemeClr val="tx1"/>
+            </a:fontRef>
+          </p:style>
+        </p:cxnSp>
+      </p:grpSp>
+    </p:spTree>
+    <p:extLst>
+      <p:ext uri="{BB962C8B-B14F-4D97-AF65-F5344CB8AC3E}">
+        <p14:creationId xmlns:p14="http://schemas.microsoft.com/office/powerpoint/2010/main" val="3470903494"/>
+      </p:ext>
+    </p:extLst>
   </p:cSld>
   <p:clrMapOvr>
     <a:masterClrMapping/>
@@ -8726,13 +11049,34 @@
               </a:lnSpc>
             </a:pPr>
             <a:r>
-              <a:rPr lang="en-US" sz="4700">
+              <a:rPr lang="en-US" sz="4700" dirty="0" err="1">
                 <a:solidFill>
                   <a:srgbClr val="FFFFFF"/>
                 </a:solidFill>
               </a:rPr>
-              <a:t>Mögliche Angriffe</a:t>
+              <a:t>Mögliche</a:t>
             </a:r>
+            <a:r>
+              <a:rPr lang="en-US" sz="4700" dirty="0">
+                <a:solidFill>
+                  <a:srgbClr val="FFFFFF"/>
+                </a:solidFill>
+              </a:rPr>
+              <a:t> </a:t>
+            </a:r>
+            <a:r>
+              <a:rPr lang="en-US" sz="4700" dirty="0" err="1">
+                <a:solidFill>
+                  <a:srgbClr val="FFFFFF"/>
+                </a:solidFill>
+              </a:rPr>
+              <a:t>Angriffe</a:t>
+            </a:r>
+            <a:endParaRPr lang="en-US" sz="4700" dirty="0">
+              <a:solidFill>
+                <a:srgbClr val="FFFFFF"/>
+              </a:solidFill>
+            </a:endParaRPr>
           </a:p>
         </p:txBody>
       </p:sp>
@@ -11247,6 +13591,64 @@
       <p:bldP spid="15" grpId="0" animBg="1"/>
     </p:bldLst>
   </p:timing>
+</p:sld>
+</file>
+
+<file path=ppt/slides/slide9.xml><?xml version="1.0" encoding="utf-8"?>
+<p:sld xmlns:a="http://schemas.openxmlformats.org/drawingml/2006/main" xmlns:r="http://schemas.openxmlformats.org/officeDocument/2006/relationships" xmlns:p="http://schemas.openxmlformats.org/presentationml/2006/main">
+  <p:cSld>
+    <p:spTree>
+      <p:nvGrpSpPr>
+        <p:cNvPr id="1" name=""/>
+        <p:cNvGrpSpPr/>
+        <p:nvPr/>
+      </p:nvGrpSpPr>
+      <p:grpSpPr>
+        <a:xfrm>
+          <a:off x="0" y="0"/>
+          <a:ext cx="0" cy="0"/>
+          <a:chOff x="0" y="0"/>
+          <a:chExt cx="0" cy="0"/>
+        </a:xfrm>
+      </p:grpSpPr>
+      <p:sp>
+        <p:nvSpPr>
+          <p:cNvPr id="4" name="Titel 3">
+            <a:extLst>
+              <a:ext uri="{FF2B5EF4-FFF2-40B4-BE49-F238E27FC236}">
+                <a16:creationId xmlns:a16="http://schemas.microsoft.com/office/drawing/2014/main" id="{28BE2B57-CD47-284A-624C-3D849B7D26A1}"/>
+              </a:ext>
+            </a:extLst>
+          </p:cNvPr>
+          <p:cNvSpPr>
+            <a:spLocks noGrp="1"/>
+          </p:cNvSpPr>
+          <p:nvPr>
+            <p:ph type="ctrTitle"/>
+          </p:nvPr>
+        </p:nvSpPr>
+        <p:spPr/>
+        <p:txBody>
+          <a:bodyPr/>
+          <a:lstStyle/>
+          <a:p>
+            <a:r>
+              <a:rPr lang="de-DE" dirty="0"/>
+              <a:t>Passwörter</a:t>
+            </a:r>
+          </a:p>
+        </p:txBody>
+      </p:sp>
+    </p:spTree>
+    <p:extLst>
+      <p:ext uri="{BB962C8B-B14F-4D97-AF65-F5344CB8AC3E}">
+        <p14:creationId xmlns:p14="http://schemas.microsoft.com/office/powerpoint/2010/main" val="2985341723"/>
+      </p:ext>
+    </p:extLst>
+  </p:cSld>
+  <p:clrMapOvr>
+    <a:masterClrMapping/>
+  </p:clrMapOvr>
 </p:sld>
 </file>
 

</xml_diff>